<commit_message>
Updated powerpoint page 3
</commit_message>
<xml_diff>
--- a/Presentation.pptx
+++ b/Presentation.pptx
@@ -116,6 +116,113 @@
     </p:ext>
   </p:extLst>
 </p:presentation>
+</file>
+
+<file path=ppt/revisionInfo.xml><?xml version="1.0" encoding="utf-8"?>
+<p1510:revInfo xmlns:a="http://schemas.openxmlformats.org/drawingml/2006/main" xmlns:r="http://schemas.openxmlformats.org/officeDocument/2006/relationships" xmlns:p1510="http://schemas.microsoft.com/office/powerpoint/2015/10/main">
+  <p1510:revLst>
+    <p1510:client id="{F864161F-344C-40A2-8DAB-89930D8BF581}" v="118" dt="2024-11-05T03:38:13.046"/>
+  </p1510:revLst>
+</p1510:revInfo>
+</file>
+
+<file path=ppt/changesInfos/changesInfo1.xml><?xml version="1.0" encoding="utf-8"?>
+<pc:chgInfo xmlns:a="http://schemas.openxmlformats.org/drawingml/2006/main" xmlns:r="http://schemas.openxmlformats.org/officeDocument/2006/relationships" xmlns:ac="http://schemas.microsoft.com/office/drawing/2013/main/command" xmlns:pc="http://schemas.microsoft.com/office/powerpoint/2013/main/command">
+  <pc:docChgLst>
+    <pc:chgData name="YUE, Ka Leung" userId="541129f1-78f9-4b79-9dd5-c893242432f5" providerId="ADAL" clId="{F864161F-344C-40A2-8DAB-89930D8BF581}"/>
+    <pc:docChg chg="undo redo custSel modSld">
+      <pc:chgData name="YUE, Ka Leung" userId="541129f1-78f9-4b79-9dd5-c893242432f5" providerId="ADAL" clId="{F864161F-344C-40A2-8DAB-89930D8BF581}" dt="2024-11-05T03:51:52.562" v="439" actId="1036"/>
+      <pc:docMkLst>
+        <pc:docMk/>
+      </pc:docMkLst>
+      <pc:sldChg chg="modSp mod">
+        <pc:chgData name="YUE, Ka Leung" userId="541129f1-78f9-4b79-9dd5-c893242432f5" providerId="ADAL" clId="{F864161F-344C-40A2-8DAB-89930D8BF581}" dt="2024-11-05T03:02:13.098" v="28" actId="20577"/>
+        <pc:sldMkLst>
+          <pc:docMk/>
+          <pc:sldMk cId="2374378964" sldId="257"/>
+        </pc:sldMkLst>
+        <pc:spChg chg="mod">
+          <ac:chgData name="YUE, Ka Leung" userId="541129f1-78f9-4b79-9dd5-c893242432f5" providerId="ADAL" clId="{F864161F-344C-40A2-8DAB-89930D8BF581}" dt="2024-11-05T03:02:13.098" v="28" actId="20577"/>
+          <ac:spMkLst>
+            <pc:docMk/>
+            <pc:sldMk cId="2374378964" sldId="257"/>
+            <ac:spMk id="3" creationId="{58834CCC-396A-83AB-0CEC-E12C15CC31A6}"/>
+          </ac:spMkLst>
+        </pc:spChg>
+      </pc:sldChg>
+      <pc:sldChg chg="addSp delSp modSp mod">
+        <pc:chgData name="YUE, Ka Leung" userId="541129f1-78f9-4b79-9dd5-c893242432f5" providerId="ADAL" clId="{F864161F-344C-40A2-8DAB-89930D8BF581}" dt="2024-11-05T03:51:52.562" v="439" actId="1036"/>
+        <pc:sldMkLst>
+          <pc:docMk/>
+          <pc:sldMk cId="3102949145" sldId="258"/>
+        </pc:sldMkLst>
+        <pc:spChg chg="mod">
+          <ac:chgData name="YUE, Ka Leung" userId="541129f1-78f9-4b79-9dd5-c893242432f5" providerId="ADAL" clId="{F864161F-344C-40A2-8DAB-89930D8BF581}" dt="2024-11-05T03:51:52.562" v="439" actId="1036"/>
+          <ac:spMkLst>
+            <pc:docMk/>
+            <pc:sldMk cId="3102949145" sldId="258"/>
+            <ac:spMk id="3" creationId="{87FE9185-727A-05EB-9BBB-ABA356B4242B}"/>
+          </ac:spMkLst>
+        </pc:spChg>
+        <pc:picChg chg="add del mod">
+          <ac:chgData name="YUE, Ka Leung" userId="541129f1-78f9-4b79-9dd5-c893242432f5" providerId="ADAL" clId="{F864161F-344C-40A2-8DAB-89930D8BF581}" dt="2024-11-05T03:44:22.031" v="331" actId="478"/>
+          <ac:picMkLst>
+            <pc:docMk/>
+            <pc:sldMk cId="3102949145" sldId="258"/>
+            <ac:picMk id="5" creationId="{038652F9-85CF-193E-45DA-7DE65CC98081}"/>
+          </ac:picMkLst>
+        </pc:picChg>
+        <pc:picChg chg="add del mod">
+          <ac:chgData name="YUE, Ka Leung" userId="541129f1-78f9-4b79-9dd5-c893242432f5" providerId="ADAL" clId="{F864161F-344C-40A2-8DAB-89930D8BF581}" dt="2024-11-05T03:37:04.762" v="277" actId="478"/>
+          <ac:picMkLst>
+            <pc:docMk/>
+            <pc:sldMk cId="3102949145" sldId="258"/>
+            <ac:picMk id="7" creationId="{8EE43075-A467-2ECA-8868-A012125562C1}"/>
+          </ac:picMkLst>
+        </pc:picChg>
+        <pc:picChg chg="add mod">
+          <ac:chgData name="YUE, Ka Leung" userId="541129f1-78f9-4b79-9dd5-c893242432f5" providerId="ADAL" clId="{F864161F-344C-40A2-8DAB-89930D8BF581}" dt="2024-11-05T03:37:29.048" v="295" actId="1038"/>
+          <ac:picMkLst>
+            <pc:docMk/>
+            <pc:sldMk cId="3102949145" sldId="258"/>
+            <ac:picMk id="9" creationId="{0C6BC097-7C06-3229-05E1-AA7C21CDD1B9}"/>
+          </ac:picMkLst>
+        </pc:picChg>
+        <pc:picChg chg="add mod">
+          <ac:chgData name="YUE, Ka Leung" userId="541129f1-78f9-4b79-9dd5-c893242432f5" providerId="ADAL" clId="{F864161F-344C-40A2-8DAB-89930D8BF581}" dt="2024-11-05T03:49:19.293" v="385" actId="1038"/>
+          <ac:picMkLst>
+            <pc:docMk/>
+            <pc:sldMk cId="3102949145" sldId="258"/>
+            <ac:picMk id="11" creationId="{E2F116AD-3C1A-6948-CB55-33C36433F3B8}"/>
+          </ac:picMkLst>
+        </pc:picChg>
+        <pc:picChg chg="mod">
+          <ac:chgData name="YUE, Ka Leung" userId="541129f1-78f9-4b79-9dd5-c893242432f5" providerId="ADAL" clId="{F864161F-344C-40A2-8DAB-89930D8BF581}" dt="2024-11-05T03:38:13.046" v="329" actId="1038"/>
+          <ac:picMkLst>
+            <pc:docMk/>
+            <pc:sldMk cId="3102949145" sldId="258"/>
+            <ac:picMk id="3076" creationId="{1D3F9191-A720-49F1-CC0A-B9C1DC7F8AB6}"/>
+          </ac:picMkLst>
+        </pc:picChg>
+      </pc:sldChg>
+      <pc:sldChg chg="modSp mod">
+        <pc:chgData name="YUE, Ka Leung" userId="541129f1-78f9-4b79-9dd5-c893242432f5" providerId="ADAL" clId="{F864161F-344C-40A2-8DAB-89930D8BF581}" dt="2024-11-05T03:40:32.912" v="330" actId="20577"/>
+        <pc:sldMkLst>
+          <pc:docMk/>
+          <pc:sldMk cId="3061954038" sldId="259"/>
+        </pc:sldMkLst>
+        <pc:spChg chg="mod">
+          <ac:chgData name="YUE, Ka Leung" userId="541129f1-78f9-4b79-9dd5-c893242432f5" providerId="ADAL" clId="{F864161F-344C-40A2-8DAB-89930D8BF581}" dt="2024-11-05T03:40:32.912" v="330" actId="20577"/>
+          <ac:spMkLst>
+            <pc:docMk/>
+            <pc:sldMk cId="3061954038" sldId="259"/>
+            <ac:spMk id="3" creationId="{51D9DE7A-0F75-77AD-0B59-F445955C7F8B}"/>
+          </ac:spMkLst>
+        </pc:spChg>
+      </pc:sldChg>
+    </pc:docChg>
+  </pc:docChgLst>
+</pc:chgInfo>
 </file>
 
 <file path=ppt/notesMasters/notesMaster1.xml><?xml version="1.0" encoding="utf-8"?>
@@ -6668,8 +6775,12 @@
           <a:p>
             <a:pPr lvl="1"/>
             <a:r>
+              <a:rPr lang="en-US" altLang="zh-HK" i="1" dirty="0"/>
+              <a:t>Man</a:t>
+            </a:r>
+            <a:r>
               <a:rPr lang="en-US" altLang="zh-HK" dirty="0"/>
-              <a:t>Man = &lt;1, </a:t>
+              <a:t> = &lt;1, </a:t>
             </a:r>
             <a:r>
               <a:rPr lang="en-US" altLang="zh-HK" dirty="0">
@@ -6687,8 +6798,12 @@
           <a:p>
             <a:pPr lvl="1"/>
             <a:r>
+              <a:rPr lang="en-US" altLang="zh-HK" i="1" dirty="0"/>
+              <a:t>Woman</a:t>
+            </a:r>
+            <a:r>
               <a:rPr lang="en-US" altLang="zh-HK" dirty="0"/>
-              <a:t>Woman = </a:t>
+              <a:t> = </a:t>
             </a:r>
             <a:r>
               <a:rPr lang="en-US" altLang="zh-HK" dirty="0">
@@ -6720,8 +6835,12 @@
           <a:p>
             <a:pPr lvl="1"/>
             <a:r>
+              <a:rPr lang="en-US" altLang="zh-HK" i="1" dirty="0"/>
+              <a:t>King</a:t>
+            </a:r>
+            <a:r>
               <a:rPr lang="en-US" altLang="zh-HK" dirty="0"/>
-              <a:t>King = &lt;</a:t>
+              <a:t> = &lt;</a:t>
             </a:r>
             <a:r>
               <a:rPr lang="en-US" altLang="zh-HK" dirty="0">
@@ -6751,8 +6870,32 @@
           <a:p>
             <a:pPr lvl="1"/>
             <a:r>
+              <a:rPr lang="en-US" altLang="zh-HK" i="1" dirty="0"/>
+              <a:t>Queen</a:t>
+            </a:r>
+            <a:r>
               <a:rPr lang="en-US" altLang="zh-HK" dirty="0"/>
-              <a:t>Queen = King – Man + Woman</a:t>
+              <a:t> = </a:t>
+            </a:r>
+            <a:r>
+              <a:rPr lang="en-US" altLang="zh-HK" i="1" dirty="0"/>
+              <a:t>King </a:t>
+            </a:r>
+            <a:r>
+              <a:rPr lang="en-US" altLang="zh-HK" dirty="0"/>
+              <a:t>– </a:t>
+            </a:r>
+            <a:r>
+              <a:rPr lang="en-US" altLang="zh-HK" i="1" dirty="0"/>
+              <a:t>Man </a:t>
+            </a:r>
+            <a:r>
+              <a:rPr lang="en-US" altLang="zh-HK" dirty="0"/>
+              <a:t>+ </a:t>
+            </a:r>
+            <a:r>
+              <a:rPr lang="en-US" altLang="zh-HK" i="1" dirty="0"/>
+              <a:t>Woman</a:t>
             </a:r>
             <a:br>
               <a:rPr lang="en-US" altLang="zh-HK" dirty="0"/>
@@ -6985,8 +7128,8 @@
           </a:p>
         </p:txBody>
       </p:sp>
-      <mc:AlternateContent xmlns:mc="http://schemas.openxmlformats.org/markup-compatibility/2006" xmlns:a14="http://schemas.microsoft.com/office/drawing/2010/main">
-        <mc:Choice Requires="a14">
+      <mc:AlternateContent xmlns:mc="http://schemas.openxmlformats.org/markup-compatibility/2006">
+        <mc:Choice xmlns:a14="http://schemas.microsoft.com/office/drawing/2010/main" Requires="a14">
           <p:sp>
             <p:nvSpPr>
               <p:cNvPr id="3" name="內容版面配置區 2">
@@ -7025,7 +7168,7 @@
                       <a:srgbClr val="00B0F0"/>
                     </a:solidFill>
                   </a:rPr>
-                  <a:t>context words </a:t>
+                  <a:t>Outside context words </a:t>
                 </a:r>
                 <a:r>
                   <a:rPr lang="en-US" altLang="zh-HK" dirty="0">
@@ -7040,7 +7183,7 @@
                     </a:solidFill>
                     <a:sym typeface="Wingdings" panose="05000000000000000000" pitchFamily="2" charset="2"/>
                   </a:rPr>
-                  <a:t>target word</a:t>
+                  <a:t>Center word</a:t>
                 </a:r>
               </a:p>
               <a:p>
@@ -7057,7 +7200,7 @@
                     </a:solidFill>
                     <a:sym typeface="Wingdings" panose="05000000000000000000" pitchFamily="2" charset="2"/>
                   </a:rPr>
-                  <a:t>target word </a:t>
+                  <a:t>Center word </a:t>
                 </a:r>
                 <a:r>
                   <a:rPr lang="en-US" altLang="zh-HK" dirty="0">
@@ -7072,7 +7215,7 @@
                     </a:solidFill>
                     <a:sym typeface="Wingdings" panose="05000000000000000000" pitchFamily="2" charset="2"/>
                   </a:rPr>
-                  <a:t>context words</a:t>
+                  <a:t>Outside context words</a:t>
                 </a:r>
               </a:p>
               <a:p>
@@ -7137,13 +7280,13 @@
                       </m:dPr>
                       <m:e>
                         <m:r>
-                          <a:rPr lang="en-US" altLang="zh-HK" sz="2200" b="0" i="1" smtClean="0">
+                          <a:rPr lang="en-HK" altLang="zh-HK" sz="2200" b="0" i="1" smtClean="0">
                             <a:solidFill>
                               <a:srgbClr val="92D050"/>
                             </a:solidFill>
                             <a:latin typeface="Cambria Math" panose="02040503050406030204" pitchFamily="18" charset="0"/>
                           </a:rPr>
-                          <m:t>𝐶</m:t>
+                          <m:t>𝑂</m:t>
                         </m:r>
                         <m:r>
                           <a:rPr lang="en-US" altLang="zh-HK" sz="2200" b="0" i="1" smtClean="0">
@@ -7154,40 +7297,25 @@
                           </a:rPr>
                           <m:t>=</m:t>
                         </m:r>
-                        <m:acc>
-                          <m:accPr>
-                            <m:chr m:val="⃗"/>
-                            <m:ctrlPr>
-                              <a:rPr lang="en-US" altLang="zh-HK" sz="2200" b="0" i="1" smtClean="0">
-                                <a:solidFill>
-                                  <a:srgbClr val="92D050"/>
-                                </a:solidFill>
-                                <a:latin typeface="Cambria Math" panose="02040503050406030204" pitchFamily="18" charset="0"/>
-                              </a:rPr>
-                            </m:ctrlPr>
-                          </m:accPr>
-                          <m:e>
-                            <m:r>
-                              <a:rPr lang="en-US" altLang="zh-HK" sz="2200" b="0" i="1" smtClean="0">
-                                <a:solidFill>
-                                  <a:srgbClr val="92D050"/>
-                                </a:solidFill>
-                                <a:latin typeface="Cambria Math" panose="02040503050406030204" pitchFamily="18" charset="0"/>
-                              </a:rPr>
-                              <m:t>𝑐</m:t>
-                            </m:r>
-                          </m:e>
-                        </m:acc>
+                        <m:r>
+                          <a:rPr lang="en-HK" altLang="zh-HK" sz="2200" b="0" i="1" smtClean="0">
+                            <a:solidFill>
+                              <a:srgbClr val="92D050"/>
+                            </a:solidFill>
+                            <a:latin typeface="Cambria Math" panose="02040503050406030204" pitchFamily="18" charset="0"/>
+                          </a:rPr>
+                          <m:t>𝑜</m:t>
+                        </m:r>
                       </m:e>
                       <m:e>
                         <m:r>
-                          <a:rPr lang="en-US" altLang="zh-HK" sz="2200" b="0" i="1" smtClean="0">
+                          <a:rPr lang="en-HK" altLang="zh-HK" sz="2200" b="0" i="1" smtClean="0">
                             <a:solidFill>
                               <a:srgbClr val="00B0F0"/>
                             </a:solidFill>
                             <a:latin typeface="Cambria Math" panose="02040503050406030204" pitchFamily="18" charset="0"/>
                           </a:rPr>
-                          <m:t>𝑇</m:t>
+                          <m:t>𝐶</m:t>
                         </m:r>
                         <m:r>
                           <a:rPr lang="en-US" altLang="zh-HK" sz="2200" b="0" i="1" smtClean="0">
@@ -7198,30 +7326,15 @@
                           </a:rPr>
                           <m:t>=</m:t>
                         </m:r>
-                        <m:acc>
-                          <m:accPr>
-                            <m:chr m:val="⃗"/>
-                            <m:ctrlPr>
-                              <a:rPr lang="en-US" altLang="zh-HK" sz="2200" b="0" i="1" smtClean="0">
-                                <a:solidFill>
-                                  <a:srgbClr val="00B0F0"/>
-                                </a:solidFill>
-                                <a:latin typeface="Cambria Math" panose="02040503050406030204" pitchFamily="18" charset="0"/>
-                              </a:rPr>
-                            </m:ctrlPr>
-                          </m:accPr>
-                          <m:e>
-                            <m:r>
-                              <a:rPr lang="en-US" altLang="zh-HK" sz="2200" b="0" i="1" smtClean="0">
-                                <a:solidFill>
-                                  <a:srgbClr val="00B0F0"/>
-                                </a:solidFill>
-                                <a:latin typeface="Cambria Math" panose="02040503050406030204" pitchFamily="18" charset="0"/>
-                              </a:rPr>
-                              <m:t>𝑡</m:t>
-                            </m:r>
-                          </m:e>
-                        </m:acc>
+                        <m:r>
+                          <a:rPr lang="en-HK" altLang="zh-HK" sz="2200" b="0" i="1" smtClean="0">
+                            <a:solidFill>
+                              <a:srgbClr val="00B0F0"/>
+                            </a:solidFill>
+                            <a:latin typeface="Cambria Math" panose="02040503050406030204" pitchFamily="18" charset="0"/>
+                          </a:rPr>
+                          <m:t>𝑐</m:t>
+                        </m:r>
                       </m:e>
                     </m:d>
                     <m:r>
@@ -7281,28 +7394,39 @@
                                 </m:ctrlPr>
                               </m:accPr>
                               <m:e>
-                                <m:sSup>
-                                  <m:sSupPr>
+                                <m:sSubSup>
+                                  <m:sSubSupPr>
                                     <m:ctrlPr>
-                                      <a:rPr lang="en-US" altLang="zh-HK" sz="2200" b="0" i="1" smtClean="0">
+                                      <a:rPr lang="en-HK" altLang="zh-HK" sz="2200" b="0" i="1" smtClean="0">
                                         <a:solidFill>
                                           <a:srgbClr val="92D050"/>
                                         </a:solidFill>
                                         <a:latin typeface="Cambria Math" panose="02040503050406030204" pitchFamily="18" charset="0"/>
                                       </a:rPr>
                                     </m:ctrlPr>
-                                  </m:sSupPr>
+                                  </m:sSubSupPr>
                                   <m:e>
                                     <m:r>
-                                      <a:rPr lang="en-US" altLang="zh-HK" sz="2200" b="0" i="1" smtClean="0">
+                                      <a:rPr lang="en-HK" altLang="zh-HK" sz="2200" b="0" i="1" smtClean="0">
                                         <a:solidFill>
                                           <a:srgbClr val="92D050"/>
                                         </a:solidFill>
                                         <a:latin typeface="Cambria Math" panose="02040503050406030204" pitchFamily="18" charset="0"/>
                                       </a:rPr>
-                                      <m:t>𝑐</m:t>
+                                      <m:t>𝑢</m:t>
                                     </m:r>
                                   </m:e>
+                                  <m:sub>
+                                    <m:r>
+                                      <a:rPr lang="en-HK" altLang="zh-HK" sz="2200" b="0" i="1" smtClean="0">
+                                        <a:solidFill>
+                                          <a:srgbClr val="92D050"/>
+                                        </a:solidFill>
+                                        <a:latin typeface="Cambria Math" panose="02040503050406030204" pitchFamily="18" charset="0"/>
+                                      </a:rPr>
+                                      <m:t>𝑜</m:t>
+                                    </m:r>
+                                  </m:sub>
                                   <m:sup>
                                     <m:r>
                                       <a:rPr lang="en-US" altLang="zh-HK" sz="2200" b="0" i="1" smtClean="0">
@@ -7314,7 +7438,7 @@
                                       <m:t>𝑇</m:t>
                                     </m:r>
                                   </m:sup>
-                                </m:sSup>
+                                </m:sSubSup>
                               </m:e>
                             </m:acc>
                             <m:r>
@@ -7338,16 +7462,43 @@
                                 </m:ctrlPr>
                               </m:accPr>
                               <m:e>
-                                <m:r>
-                                  <a:rPr lang="en-US" altLang="zh-HK" sz="2200" b="0" i="1" dirty="0" smtClean="0">
-                                    <a:solidFill>
-                                      <a:srgbClr val="00B0F0"/>
-                                    </a:solidFill>
-                                    <a:latin typeface="Cambria Math" panose="02040503050406030204" pitchFamily="18" charset="0"/>
-                                    <a:ea typeface="Cambria Math" panose="02040503050406030204" pitchFamily="18" charset="0"/>
-                                  </a:rPr>
-                                  <m:t>𝑡</m:t>
-                                </m:r>
+                                <m:sSub>
+                                  <m:sSubPr>
+                                    <m:ctrlPr>
+                                      <a:rPr lang="en-HK" altLang="zh-HK" sz="2200" b="0" i="1" dirty="0" smtClean="0">
+                                        <a:solidFill>
+                                          <a:srgbClr val="00B0F0"/>
+                                        </a:solidFill>
+                                        <a:latin typeface="Cambria Math" panose="02040503050406030204" pitchFamily="18" charset="0"/>
+                                        <a:ea typeface="Cambria Math" panose="02040503050406030204" pitchFamily="18" charset="0"/>
+                                      </a:rPr>
+                                    </m:ctrlPr>
+                                  </m:sSubPr>
+                                  <m:e>
+                                    <m:r>
+                                      <a:rPr lang="en-HK" altLang="zh-HK" sz="2200" b="0" i="1" dirty="0" smtClean="0">
+                                        <a:solidFill>
+                                          <a:srgbClr val="00B0F0"/>
+                                        </a:solidFill>
+                                        <a:latin typeface="Cambria Math" panose="02040503050406030204" pitchFamily="18" charset="0"/>
+                                        <a:ea typeface="Cambria Math" panose="02040503050406030204" pitchFamily="18" charset="0"/>
+                                      </a:rPr>
+                                      <m:t>𝑣</m:t>
+                                    </m:r>
+                                  </m:e>
+                                  <m:sub>
+                                    <m:r>
+                                      <a:rPr lang="en-HK" altLang="zh-HK" sz="2200" b="0" i="1" dirty="0" smtClean="0">
+                                        <a:solidFill>
+                                          <a:srgbClr val="00B0F0"/>
+                                        </a:solidFill>
+                                        <a:latin typeface="Cambria Math" panose="02040503050406030204" pitchFamily="18" charset="0"/>
+                                        <a:ea typeface="Cambria Math" panose="02040503050406030204" pitchFamily="18" charset="0"/>
+                                      </a:rPr>
+                                      <m:t>𝑐</m:t>
+                                    </m:r>
+                                  </m:sub>
+                                </m:sSub>
                               </m:e>
                             </m:acc>
                           </m:sup>
@@ -7368,50 +7519,19 @@
                             </m:ctrlPr>
                           </m:naryPr>
                           <m:sub>
-                            <m:sSub>
-                              <m:sSubPr>
-                                <m:ctrlPr>
-                                  <a:rPr lang="en-US" altLang="zh-HK" sz="2200" b="0" i="1" smtClean="0">
-                                    <a:solidFill>
-                                      <a:srgbClr val="00B050"/>
-                                    </a:solidFill>
-                                    <a:latin typeface="Cambria Math" panose="02040503050406030204" pitchFamily="18" charset="0"/>
-                                  </a:rPr>
-                                </m:ctrlPr>
-                              </m:sSubPr>
-                              <m:e>
-                                <m:r>
-                                  <m:rPr>
-                                    <m:brk m:alnAt="7"/>
-                                  </m:rPr>
-                                  <a:rPr lang="en-US" altLang="zh-HK" sz="2200" b="0" i="1" smtClean="0">
-                                    <a:solidFill>
-                                      <a:srgbClr val="00B050"/>
-                                    </a:solidFill>
-                                    <a:latin typeface="Cambria Math" panose="02040503050406030204" pitchFamily="18" charset="0"/>
-                                  </a:rPr>
-                                  <m:t>𝑐</m:t>
-                                </m:r>
-                              </m:e>
-                              <m:sub>
-                                <m:r>
-                                  <m:rPr>
-                                    <m:brk m:alnAt="7"/>
-                                  </m:rPr>
-                                  <a:rPr lang="en-US" altLang="zh-HK" sz="2200" b="0" i="1" smtClean="0">
-                                    <a:solidFill>
-                                      <a:srgbClr val="00B050"/>
-                                    </a:solidFill>
-                                    <a:latin typeface="Cambria Math" panose="02040503050406030204" pitchFamily="18" charset="0"/>
-                                  </a:rPr>
-                                  <m:t>𝑖</m:t>
-                                </m:r>
-                              </m:sub>
-                            </m:sSub>
                             <m:r>
                               <m:rPr>
                                 <m:brk m:alnAt="7"/>
                               </m:rPr>
+                              <a:rPr lang="en-HK" altLang="zh-HK" sz="2200" b="0" i="1" smtClean="0">
+                                <a:solidFill>
+                                  <a:srgbClr val="00B050"/>
+                                </a:solidFill>
+                                <a:latin typeface="Cambria Math" panose="02040503050406030204" pitchFamily="18" charset="0"/>
+                              </a:rPr>
+                              <m:t>𝑤</m:t>
+                            </m:r>
+                            <m:r>
                               <a:rPr lang="en-US" altLang="zh-HK" sz="2200" b="0" i="1" smtClean="0">
                                 <a:solidFill>
                                   <a:schemeClr val="tx1"/>
@@ -7430,6 +7550,16 @@
                                 <a:ea typeface="Cambria Math" panose="02040503050406030204" pitchFamily="18" charset="0"/>
                               </a:rPr>
                               <m:t>𝑉</m:t>
+                            </m:r>
+                            <m:r>
+                              <a:rPr lang="en-HK" altLang="zh-HK" sz="2200" b="0" i="1" smtClean="0">
+                                <a:solidFill>
+                                  <a:srgbClr val="008000"/>
+                                </a:solidFill>
+                                <a:latin typeface="Cambria Math" panose="02040503050406030204" pitchFamily="18" charset="0"/>
+                                <a:ea typeface="Cambria Math" panose="02040503050406030204" pitchFamily="18" charset="0"/>
+                              </a:rPr>
+                              <m:t>𝑜𝑐𝑎𝑏</m:t>
                             </m:r>
                           </m:sub>
                           <m:sup/>
@@ -7473,7 +7603,7 @@
                                     <m:sSubSup>
                                       <m:sSubSupPr>
                                         <m:ctrlPr>
-                                          <a:rPr lang="en-US" altLang="zh-HK" sz="2200" b="0" i="1" smtClean="0">
+                                          <a:rPr lang="en-HK" altLang="zh-HK" sz="2200" b="0" i="1" smtClean="0">
                                             <a:solidFill>
                                               <a:srgbClr val="00B050"/>
                                             </a:solidFill>
@@ -7483,29 +7613,29 @@
                                       </m:sSubSupPr>
                                       <m:e>
                                         <m:r>
-                                          <a:rPr lang="en-US" altLang="zh-HK" sz="2200" i="1">
+                                          <a:rPr lang="en-HK" altLang="zh-HK" sz="2200" b="0" i="1" smtClean="0">
                                             <a:solidFill>
                                               <a:srgbClr val="00B050"/>
                                             </a:solidFill>
                                             <a:latin typeface="Cambria Math" panose="02040503050406030204" pitchFamily="18" charset="0"/>
                                           </a:rPr>
-                                          <m:t>𝑐</m:t>
+                                          <m:t>𝑢</m:t>
                                         </m:r>
                                       </m:e>
                                       <m:sub>
                                         <m:r>
-                                          <a:rPr lang="en-US" altLang="zh-HK" sz="2200" b="0" i="1" smtClean="0">
+                                          <a:rPr lang="en-HK" altLang="zh-HK" sz="2200" b="0" i="1" smtClean="0">
                                             <a:solidFill>
                                               <a:srgbClr val="00B050"/>
                                             </a:solidFill>
                                             <a:latin typeface="Cambria Math" panose="02040503050406030204" pitchFamily="18" charset="0"/>
                                           </a:rPr>
-                                          <m:t>𝑖</m:t>
+                                          <m:t>𝑤</m:t>
                                         </m:r>
                                       </m:sub>
                                       <m:sup>
                                         <m:r>
-                                          <a:rPr lang="en-US" altLang="zh-HK" sz="2200" i="1">
+                                          <a:rPr lang="en-HK" altLang="zh-HK" sz="2200" b="0" i="1" smtClean="0">
                                             <a:solidFill>
                                               <a:srgbClr val="00B050"/>
                                             </a:solidFill>
@@ -7538,16 +7668,43 @@
                                     </m:ctrlPr>
                                   </m:accPr>
                                   <m:e>
-                                    <m:r>
-                                      <a:rPr lang="en-US" altLang="zh-HK" sz="2200" b="0" i="1" dirty="0" smtClean="0">
-                                        <a:solidFill>
-                                          <a:srgbClr val="00B0F0"/>
-                                        </a:solidFill>
-                                        <a:latin typeface="Cambria Math" panose="02040503050406030204" pitchFamily="18" charset="0"/>
-                                        <a:ea typeface="Cambria Math" panose="02040503050406030204" pitchFamily="18" charset="0"/>
-                                      </a:rPr>
-                                      <m:t>𝑡</m:t>
-                                    </m:r>
+                                    <m:sSub>
+                                      <m:sSubPr>
+                                        <m:ctrlPr>
+                                          <a:rPr lang="en-HK" altLang="zh-HK" sz="2200" b="0" i="1" dirty="0" smtClean="0">
+                                            <a:solidFill>
+                                              <a:srgbClr val="00B0F0"/>
+                                            </a:solidFill>
+                                            <a:latin typeface="Cambria Math" panose="02040503050406030204" pitchFamily="18" charset="0"/>
+                                            <a:ea typeface="Cambria Math" panose="02040503050406030204" pitchFamily="18" charset="0"/>
+                                          </a:rPr>
+                                        </m:ctrlPr>
+                                      </m:sSubPr>
+                                      <m:e>
+                                        <m:r>
+                                          <a:rPr lang="en-HK" altLang="zh-HK" sz="2200" b="0" i="1" dirty="0" smtClean="0">
+                                            <a:solidFill>
+                                              <a:srgbClr val="00B0F0"/>
+                                            </a:solidFill>
+                                            <a:latin typeface="Cambria Math" panose="02040503050406030204" pitchFamily="18" charset="0"/>
+                                            <a:ea typeface="Cambria Math" panose="02040503050406030204" pitchFamily="18" charset="0"/>
+                                          </a:rPr>
+                                          <m:t>𝑣</m:t>
+                                        </m:r>
+                                      </m:e>
+                                      <m:sub>
+                                        <m:r>
+                                          <a:rPr lang="en-HK" altLang="zh-HK" sz="2200" b="0" i="1" dirty="0" smtClean="0">
+                                            <a:solidFill>
+                                              <a:srgbClr val="00B0F0"/>
+                                            </a:solidFill>
+                                            <a:latin typeface="Cambria Math" panose="02040503050406030204" pitchFamily="18" charset="0"/>
+                                            <a:ea typeface="Cambria Math" panose="02040503050406030204" pitchFamily="18" charset="0"/>
+                                          </a:rPr>
+                                          <m:t>𝑐</m:t>
+                                        </m:r>
+                                      </m:sub>
+                                    </m:sSub>
                                   </m:e>
                                 </m:acc>
                               </m:sup>
@@ -7572,7 +7729,31 @@
                       <a:schemeClr val="tx1"/>
                     </a:solidFill>
                   </a:rPr>
-                  <a:t>Do you recognize the model being trained from this equation?</a:t>
+                  <a:t>Do you recognize the model being trained from the </a:t>
+                </a:r>
+                <a:r>
+                  <a:rPr lang="en-US" altLang="zh-HK" dirty="0" err="1">
+                    <a:solidFill>
+                      <a:srgbClr val="FFFF00"/>
+                    </a:solidFill>
+                  </a:rPr>
+                  <a:t>softmax</a:t>
+                </a:r>
+                <a:r>
+                  <a:rPr lang="en-US" altLang="zh-HK" dirty="0">
+                    <a:solidFill>
+                      <a:srgbClr val="FFFF00"/>
+                    </a:solidFill>
+                  </a:rPr>
+                  <a:t> function</a:t>
+                </a:r>
+                <a:r>
+                  <a:rPr lang="en-US" altLang="zh-HK" dirty="0">
+                    <a:solidFill>
+                      <a:schemeClr val="tx1"/>
+                    </a:solidFill>
+                  </a:rPr>
+                  <a:t>?</a:t>
                 </a:r>
               </a:p>
               <a:p>
@@ -7741,13 +7922,13 @@
                           </m:accPr>
                           <m:e>
                             <m:r>
-                              <a:rPr lang="en-US" altLang="zh-HK" b="0" i="1" smtClean="0">
+                              <a:rPr lang="en-HK" altLang="zh-HK" b="0" i="1" smtClean="0">
                                 <a:solidFill>
                                   <a:schemeClr val="tx1"/>
                                 </a:solidFill>
                                 <a:latin typeface="Cambria Math" panose="02040503050406030204" pitchFamily="18" charset="0"/>
                               </a:rPr>
-                              <m:t>𝑥</m:t>
+                              <m:t>𝑎</m:t>
                             </m:r>
                           </m:e>
                         </m:acc>
@@ -7770,11 +7951,11 @@
                           </m:accPr>
                           <m:e>
                             <m:r>
-                              <a:rPr lang="en-US" altLang="zh-HK" b="0" i="1" dirty="0" smtClean="0">
+                              <a:rPr lang="en-HK" altLang="zh-HK" b="0" i="1" dirty="0" smtClean="0">
                                 <a:latin typeface="Cambria Math" panose="02040503050406030204" pitchFamily="18" charset="0"/>
                                 <a:ea typeface="Cambria Math" panose="02040503050406030204" pitchFamily="18" charset="0"/>
                               </a:rPr>
-                              <m:t>𝑦</m:t>
+                              <m:t>𝑏</m:t>
                             </m:r>
                           </m:e>
                         </m:acc>
@@ -7803,13 +7984,13 @@
                           </m:accPr>
                           <m:e>
                             <m:r>
-                              <a:rPr lang="en-US" altLang="zh-HK" b="0" i="1" smtClean="0">
+                              <a:rPr lang="en-HK" altLang="zh-HK" b="0" i="1" smtClean="0">
                                 <a:solidFill>
                                   <a:schemeClr val="tx1"/>
                                 </a:solidFill>
                                 <a:latin typeface="Cambria Math" panose="02040503050406030204" pitchFamily="18" charset="0"/>
                               </a:rPr>
-                              <m:t>𝑥</m:t>
+                              <m:t>𝑎</m:t>
                             </m:r>
                           </m:e>
                         </m:acc>
@@ -7832,11 +8013,11 @@
                           </m:accPr>
                           <m:e>
                             <m:r>
-                              <a:rPr lang="en-US" altLang="zh-HK" b="0" i="1" dirty="0" smtClean="0">
+                              <a:rPr lang="en-HK" altLang="zh-HK" b="0" i="1" dirty="0" smtClean="0">
                                 <a:latin typeface="Cambria Math" panose="02040503050406030204" pitchFamily="18" charset="0"/>
                                 <a:ea typeface="Cambria Math" panose="02040503050406030204" pitchFamily="18" charset="0"/>
                               </a:rPr>
-                              <m:t>𝑦</m:t>
+                              <m:t>𝑏</m:t>
                             </m:r>
                           </m:e>
                         </m:acc>
@@ -7865,7 +8046,7 @@
                       <a:srgbClr val="AE78D6"/>
                     </a:solidFill>
                   </a:rPr>
-                  <a:t>Similarity of the semantic meaning of the words</a:t>
+                  <a:t>Similarity of the semantic meanings of the words</a:t>
                 </a:r>
               </a:p>
               <a:p>
@@ -7896,6 +8077,27 @@
                 </a:r>
                 <a14:m>
                   <m:oMath xmlns:m="http://schemas.openxmlformats.org/officeDocument/2006/math">
+                    <m:r>
+                      <m:rPr>
+                        <m:sty m:val="p"/>
+                      </m:rPr>
+                      <a:rPr lang="en-HK" altLang="zh-HK" b="0" i="0" smtClean="0">
+                        <a:solidFill>
+                          <a:schemeClr val="tx1"/>
+                        </a:solidFill>
+                        <a:latin typeface="Cambria Math" panose="02040503050406030204" pitchFamily="18" charset="0"/>
+                      </a:rPr>
+                      <m:t>cos</m:t>
+                    </m:r>
+                    <m:r>
+                      <a:rPr lang="en-HK" altLang="zh-HK" b="0" i="0" smtClean="0">
+                        <a:solidFill>
+                          <a:schemeClr val="tx1"/>
+                        </a:solidFill>
+                        <a:latin typeface="Cambria Math" panose="02040503050406030204" pitchFamily="18" charset="0"/>
+                      </a:rPr>
+                      <m:t> </m:t>
+                    </m:r>
                     <m:r>
                       <a:rPr lang="zh-HK" altLang="en-US" i="1" smtClean="0">
                         <a:solidFill>
@@ -7935,7 +8137,7 @@
             </p:txBody>
           </p:sp>
         </mc:Choice>
-        <mc:Fallback xmlns="">
+        <mc:Fallback>
           <p:sp>
             <p:nvSpPr>
               <p:cNvPr id="3" name="內容版面配置區 2">
@@ -8008,8 +8210,8 @@
         </p:blipFill>
         <p:spPr bwMode="auto">
           <a:xfrm>
-            <a:off x="6482281" y="1991385"/>
-            <a:ext cx="5245116" cy="2875230"/>
+            <a:off x="6856266" y="2326193"/>
+            <a:ext cx="4952697" cy="2714934"/>
           </a:xfrm>
           <a:prstGeom prst="rect">
             <a:avLst/>
@@ -8024,6 +8226,66 @@
               </a14:hiddenFill>
             </a:ext>
           </a:extLst>
+        </p:spPr>
+      </p:pic>
+      <p:pic>
+        <p:nvPicPr>
+          <p:cNvPr id="9" name="Picture 8">
+            <a:extLst>
+              <a:ext uri="{FF2B5EF4-FFF2-40B4-BE49-F238E27FC236}">
+                <a16:creationId xmlns:a16="http://schemas.microsoft.com/office/drawing/2014/main" id="{0C6BC097-7C06-3229-05E1-AA7C21CDD1B9}"/>
+              </a:ext>
+            </a:extLst>
+          </p:cNvPr>
+          <p:cNvPicPr>
+            <a:picLocks noChangeAspect="1"/>
+          </p:cNvPicPr>
+          <p:nvPr/>
+        </p:nvPicPr>
+        <p:blipFill>
+          <a:blip r:embed="rId5"/>
+          <a:stretch>
+            <a:fillRect/>
+          </a:stretch>
+        </p:blipFill>
+        <p:spPr>
+          <a:xfrm>
+            <a:off x="3481381" y="4711148"/>
+            <a:ext cx="486458" cy="454162"/>
+          </a:xfrm>
+          <a:prstGeom prst="rect">
+            <a:avLst/>
+          </a:prstGeom>
+        </p:spPr>
+      </p:pic>
+      <p:pic>
+        <p:nvPicPr>
+          <p:cNvPr id="11" name="Picture 10">
+            <a:extLst>
+              <a:ext uri="{FF2B5EF4-FFF2-40B4-BE49-F238E27FC236}">
+                <a16:creationId xmlns:a16="http://schemas.microsoft.com/office/drawing/2014/main" id="{E2F116AD-3C1A-6948-CB55-33C36433F3B8}"/>
+              </a:ext>
+            </a:extLst>
+          </p:cNvPr>
+          <p:cNvPicPr>
+            <a:picLocks noChangeAspect="1"/>
+          </p:cNvPicPr>
+          <p:nvPr/>
+        </p:nvPicPr>
+        <p:blipFill>
+          <a:blip r:embed="rId6"/>
+          <a:stretch>
+            <a:fillRect/>
+          </a:stretch>
+        </p:blipFill>
+        <p:spPr>
+          <a:xfrm>
+            <a:off x="4495557" y="2896868"/>
+            <a:ext cx="2356741" cy="659803"/>
+          </a:xfrm>
+          <a:prstGeom prst="rect">
+            <a:avLst/>
+          </a:prstGeom>
         </p:spPr>
       </p:pic>
     </p:spTree>
@@ -8161,7 +8423,7 @@
             <a:pPr lvl="1"/>
             <a:r>
               <a:rPr lang="en-US" altLang="zh-HK" dirty="0"/>
-              <a:t>We will code in </a:t>
+              <a:t>We code in </a:t>
             </a:r>
             <a:r>
               <a:rPr lang="en-US" altLang="zh-HK" dirty="0">

</xml_diff>

<commit_message>
Updated powerpoint page 3 again
</commit_message>
<xml_diff>
--- a/Presentation.pptx
+++ b/Presentation.pptx
@@ -121,6 +121,7 @@
 <file path=ppt/revisionInfo.xml><?xml version="1.0" encoding="utf-8"?>
 <p1510:revInfo xmlns:a="http://schemas.openxmlformats.org/drawingml/2006/main" xmlns:r="http://schemas.openxmlformats.org/officeDocument/2006/relationships" xmlns:p1510="http://schemas.microsoft.com/office/powerpoint/2015/10/main">
   <p1510:revLst>
+    <p1510:client id="{854AE85A-E9C8-4BEA-88D8-4A6ACEAD765F}" v="3" dt="2024-11-05T04:01:47.106"/>
     <p1510:client id="{F864161F-344C-40A2-8DAB-89930D8BF581}" v="118" dt="2024-11-05T03:38:13.046"/>
   </p1510:revLst>
 </p1510:revInfo>
@@ -219,6 +220,54 @@
             <ac:spMk id="3" creationId="{51D9DE7A-0F75-77AD-0B59-F445955C7F8B}"/>
           </ac:spMkLst>
         </pc:spChg>
+      </pc:sldChg>
+    </pc:docChg>
+  </pc:docChgLst>
+  <pc:docChgLst>
+    <pc:chgData name="YUE, Ka Leung" userId="541129f1-78f9-4b79-9dd5-c893242432f5" providerId="ADAL" clId="{854AE85A-E9C8-4BEA-88D8-4A6ACEAD765F}"/>
+    <pc:docChg chg="custSel modSld">
+      <pc:chgData name="YUE, Ka Leung" userId="541129f1-78f9-4b79-9dd5-c893242432f5" providerId="ADAL" clId="{854AE85A-E9C8-4BEA-88D8-4A6ACEAD765F}" dt="2024-11-05T04:01:47.106" v="31" actId="1038"/>
+      <pc:docMkLst>
+        <pc:docMk/>
+      </pc:docMkLst>
+      <pc:sldChg chg="addSp delSp modSp mod">
+        <pc:chgData name="YUE, Ka Leung" userId="541129f1-78f9-4b79-9dd5-c893242432f5" providerId="ADAL" clId="{854AE85A-E9C8-4BEA-88D8-4A6ACEAD765F}" dt="2024-11-05T04:01:47.106" v="31" actId="1038"/>
+        <pc:sldMkLst>
+          <pc:docMk/>
+          <pc:sldMk cId="3102949145" sldId="258"/>
+        </pc:sldMkLst>
+        <pc:picChg chg="add del mod">
+          <ac:chgData name="YUE, Ka Leung" userId="541129f1-78f9-4b79-9dd5-c893242432f5" providerId="ADAL" clId="{854AE85A-E9C8-4BEA-88D8-4A6ACEAD765F}" dt="2024-11-05T04:01:06.861" v="22" actId="478"/>
+          <ac:picMkLst>
+            <pc:docMk/>
+            <pc:sldMk cId="3102949145" sldId="258"/>
+            <ac:picMk id="5" creationId="{E926B2CB-B774-BEF4-7593-C3F87DD9E52D}"/>
+          </ac:picMkLst>
+        </pc:picChg>
+        <pc:picChg chg="add mod">
+          <ac:chgData name="YUE, Ka Leung" userId="541129f1-78f9-4b79-9dd5-c893242432f5" providerId="ADAL" clId="{854AE85A-E9C8-4BEA-88D8-4A6ACEAD765F}" dt="2024-11-05T04:01:25.793" v="28" actId="14100"/>
+          <ac:picMkLst>
+            <pc:docMk/>
+            <pc:sldMk cId="3102949145" sldId="258"/>
+            <ac:picMk id="7" creationId="{DA3E1BF7-DD86-E526-F8F0-271825B462BD}"/>
+          </ac:picMkLst>
+        </pc:picChg>
+        <pc:picChg chg="del">
+          <ac:chgData name="YUE, Ka Leung" userId="541129f1-78f9-4b79-9dd5-c893242432f5" providerId="ADAL" clId="{854AE85A-E9C8-4BEA-88D8-4A6ACEAD765F}" dt="2024-11-05T03:59:31.213" v="0" actId="478"/>
+          <ac:picMkLst>
+            <pc:docMk/>
+            <pc:sldMk cId="3102949145" sldId="258"/>
+            <ac:picMk id="11" creationId="{E2F116AD-3C1A-6948-CB55-33C36433F3B8}"/>
+          </ac:picMkLst>
+        </pc:picChg>
+        <pc:picChg chg="mod">
+          <ac:chgData name="YUE, Ka Leung" userId="541129f1-78f9-4b79-9dd5-c893242432f5" providerId="ADAL" clId="{854AE85A-E9C8-4BEA-88D8-4A6ACEAD765F}" dt="2024-11-05T04:01:47.106" v="31" actId="1038"/>
+          <ac:picMkLst>
+            <pc:docMk/>
+            <pc:sldMk cId="3102949145" sldId="258"/>
+            <ac:picMk id="3076" creationId="{1D3F9191-A720-49F1-CC0A-B9C1DC7F8AB6}"/>
+          </ac:picMkLst>
+        </pc:picChg>
       </pc:sldChg>
     </pc:docChg>
   </pc:docChgLst>
@@ -7128,8 +7177,8 @@
           </a:p>
         </p:txBody>
       </p:sp>
-      <mc:AlternateContent xmlns:mc="http://schemas.openxmlformats.org/markup-compatibility/2006">
-        <mc:Choice xmlns:a14="http://schemas.microsoft.com/office/drawing/2010/main" Requires="a14">
+      <mc:AlternateContent xmlns:mc="http://schemas.openxmlformats.org/markup-compatibility/2006" xmlns:a14="http://schemas.microsoft.com/office/drawing/2010/main">
+        <mc:Choice Requires="a14">
           <p:sp>
             <p:nvSpPr>
               <p:cNvPr id="3" name="內容版面配置區 2">
@@ -8137,7 +8186,7 @@
             </p:txBody>
           </p:sp>
         </mc:Choice>
-        <mc:Fallback>
+        <mc:Fallback xmlns="">
           <p:sp>
             <p:nvSpPr>
               <p:cNvPr id="3" name="內容版面配置區 2">
@@ -8210,8 +8259,8 @@
         </p:blipFill>
         <p:spPr bwMode="auto">
           <a:xfrm>
-            <a:off x="6856266" y="2326193"/>
-            <a:ext cx="4952697" cy="2714934"/>
+            <a:off x="6926497" y="2361111"/>
+            <a:ext cx="4888998" cy="2680016"/>
           </a:xfrm>
           <a:prstGeom prst="rect">
             <a:avLst/>
@@ -8260,10 +8309,10 @@
       </p:pic>
       <p:pic>
         <p:nvPicPr>
-          <p:cNvPr id="11" name="Picture 10">
+          <p:cNvPr id="7" name="Picture 6">
             <a:extLst>
               <a:ext uri="{FF2B5EF4-FFF2-40B4-BE49-F238E27FC236}">
-                <a16:creationId xmlns:a16="http://schemas.microsoft.com/office/drawing/2014/main" id="{E2F116AD-3C1A-6948-CB55-33C36433F3B8}"/>
+                <a16:creationId xmlns:a16="http://schemas.microsoft.com/office/drawing/2014/main" id="{DA3E1BF7-DD86-E526-F8F0-271825B462BD}"/>
               </a:ext>
             </a:extLst>
           </p:cNvPr>
@@ -8280,8 +8329,8 @@
         </p:blipFill>
         <p:spPr>
           <a:xfrm>
-            <a:off x="4495557" y="2896868"/>
-            <a:ext cx="2356741" cy="659803"/>
+            <a:off x="4413407" y="2835046"/>
+            <a:ext cx="2509907" cy="787684"/>
           </a:xfrm>
           <a:prstGeom prst="rect">
             <a:avLst/>

</xml_diff>

<commit_message>
Updated pptx and code
</commit_message>
<xml_diff>
--- a/Presentation.pptx
+++ b/Presentation.pptx
@@ -121,8 +121,7 @@
 <file path=ppt/revisionInfo.xml><?xml version="1.0" encoding="utf-8"?>
 <p1510:revInfo xmlns:a="http://schemas.openxmlformats.org/drawingml/2006/main" xmlns:r="http://schemas.openxmlformats.org/officeDocument/2006/relationships" xmlns:p1510="http://schemas.microsoft.com/office/powerpoint/2015/10/main">
   <p1510:revLst>
-    <p1510:client id="{854AE85A-E9C8-4BEA-88D8-4A6ACEAD765F}" v="3" dt="2024-11-05T04:01:47.106"/>
-    <p1510:client id="{F864161F-344C-40A2-8DAB-89930D8BF581}" v="118" dt="2024-11-05T03:38:13.046"/>
+    <p1510:client id="{854AE85A-E9C8-4BEA-88D8-4A6ACEAD765F}" v="78" dt="2024-11-12T09:29:45.669"/>
   </p1510:revLst>
 </p1510:revInfo>
 </file>
@@ -225,17 +224,48 @@
   </pc:docChgLst>
   <pc:docChgLst>
     <pc:chgData name="YUE, Ka Leung" userId="541129f1-78f9-4b79-9dd5-c893242432f5" providerId="ADAL" clId="{854AE85A-E9C8-4BEA-88D8-4A6ACEAD765F}"/>
-    <pc:docChg chg="custSel modSld">
-      <pc:chgData name="YUE, Ka Leung" userId="541129f1-78f9-4b79-9dd5-c893242432f5" providerId="ADAL" clId="{854AE85A-E9C8-4BEA-88D8-4A6ACEAD765F}" dt="2024-11-05T04:01:47.106" v="31" actId="1038"/>
+    <pc:docChg chg="undo redo custSel modSld">
+      <pc:chgData name="YUE, Ka Leung" userId="541129f1-78f9-4b79-9dd5-c893242432f5" providerId="ADAL" clId="{854AE85A-E9C8-4BEA-88D8-4A6ACEAD765F}" dt="2024-11-12T10:14:22.226" v="974" actId="478"/>
       <pc:docMkLst>
         <pc:docMk/>
       </pc:docMkLst>
+      <pc:sldChg chg="modSp mod">
+        <pc:chgData name="YUE, Ka Leung" userId="541129f1-78f9-4b79-9dd5-c893242432f5" providerId="ADAL" clId="{854AE85A-E9C8-4BEA-88D8-4A6ACEAD765F}" dt="2024-11-12T09:07:17.633" v="540" actId="20577"/>
+        <pc:sldMkLst>
+          <pc:docMk/>
+          <pc:sldMk cId="2374378964" sldId="257"/>
+        </pc:sldMkLst>
+        <pc:spChg chg="mod">
+          <ac:chgData name="YUE, Ka Leung" userId="541129f1-78f9-4b79-9dd5-c893242432f5" providerId="ADAL" clId="{854AE85A-E9C8-4BEA-88D8-4A6ACEAD765F}" dt="2024-11-12T09:07:17.633" v="540" actId="20577"/>
+          <ac:spMkLst>
+            <pc:docMk/>
+            <pc:sldMk cId="2374378964" sldId="257"/>
+            <ac:spMk id="3" creationId="{58834CCC-396A-83AB-0CEC-E12C15CC31A6}"/>
+          </ac:spMkLst>
+        </pc:spChg>
+        <pc:picChg chg="mod">
+          <ac:chgData name="YUE, Ka Leung" userId="541129f1-78f9-4b79-9dd5-c893242432f5" providerId="ADAL" clId="{854AE85A-E9C8-4BEA-88D8-4A6ACEAD765F}" dt="2024-11-12T08:59:34.340" v="200" actId="1036"/>
+          <ac:picMkLst>
+            <pc:docMk/>
+            <pc:sldMk cId="2374378964" sldId="257"/>
+            <ac:picMk id="2050" creationId="{3353F6F6-2512-3873-893B-1EF077E1A709}"/>
+          </ac:picMkLst>
+        </pc:picChg>
+      </pc:sldChg>
       <pc:sldChg chg="addSp delSp modSp mod">
-        <pc:chgData name="YUE, Ka Leung" userId="541129f1-78f9-4b79-9dd5-c893242432f5" providerId="ADAL" clId="{854AE85A-E9C8-4BEA-88D8-4A6ACEAD765F}" dt="2024-11-05T04:01:47.106" v="31" actId="1038"/>
+        <pc:chgData name="YUE, Ka Leung" userId="541129f1-78f9-4b79-9dd5-c893242432f5" providerId="ADAL" clId="{854AE85A-E9C8-4BEA-88D8-4A6ACEAD765F}" dt="2024-11-12T09:29:47.493" v="681" actId="1038"/>
         <pc:sldMkLst>
           <pc:docMk/>
           <pc:sldMk cId="3102949145" sldId="258"/>
         </pc:sldMkLst>
+        <pc:spChg chg="mod">
+          <ac:chgData name="YUE, Ka Leung" userId="541129f1-78f9-4b79-9dd5-c893242432f5" providerId="ADAL" clId="{854AE85A-E9C8-4BEA-88D8-4A6ACEAD765F}" dt="2024-11-12T09:29:36.038" v="672" actId="20577"/>
+          <ac:spMkLst>
+            <pc:docMk/>
+            <pc:sldMk cId="3102949145" sldId="258"/>
+            <ac:spMk id="3" creationId="{87FE9185-727A-05EB-9BBB-ABA356B4242B}"/>
+          </ac:spMkLst>
+        </pc:spChg>
         <pc:picChg chg="add del mod">
           <ac:chgData name="YUE, Ka Leung" userId="541129f1-78f9-4b79-9dd5-c893242432f5" providerId="ADAL" clId="{854AE85A-E9C8-4BEA-88D8-4A6ACEAD765F}" dt="2024-11-05T04:01:06.861" v="22" actId="478"/>
           <ac:picMkLst>
@@ -245,11 +275,19 @@
           </ac:picMkLst>
         </pc:picChg>
         <pc:picChg chg="add mod">
-          <ac:chgData name="YUE, Ka Leung" userId="541129f1-78f9-4b79-9dd5-c893242432f5" providerId="ADAL" clId="{854AE85A-E9C8-4BEA-88D8-4A6ACEAD765F}" dt="2024-11-05T04:01:25.793" v="28" actId="14100"/>
+          <ac:chgData name="YUE, Ka Leung" userId="541129f1-78f9-4b79-9dd5-c893242432f5" providerId="ADAL" clId="{854AE85A-E9C8-4BEA-88D8-4A6ACEAD765F}" dt="2024-11-12T09:29:47.493" v="681" actId="1038"/>
           <ac:picMkLst>
             <pc:docMk/>
             <pc:sldMk cId="3102949145" sldId="258"/>
             <ac:picMk id="7" creationId="{DA3E1BF7-DD86-E526-F8F0-271825B462BD}"/>
+          </ac:picMkLst>
+        </pc:picChg>
+        <pc:picChg chg="mod">
+          <ac:chgData name="YUE, Ka Leung" userId="541129f1-78f9-4b79-9dd5-c893242432f5" providerId="ADAL" clId="{854AE85A-E9C8-4BEA-88D8-4A6ACEAD765F}" dt="2024-11-12T09:28:30.399" v="649" actId="1036"/>
+          <ac:picMkLst>
+            <pc:docMk/>
+            <pc:sldMk cId="3102949145" sldId="258"/>
+            <ac:picMk id="9" creationId="{0C6BC097-7C06-3229-05E1-AA7C21CDD1B9}"/>
           </ac:picMkLst>
         </pc:picChg>
         <pc:picChg chg="del">
@@ -260,18 +298,126 @@
             <ac:picMk id="11" creationId="{E2F116AD-3C1A-6948-CB55-33C36433F3B8}"/>
           </ac:picMkLst>
         </pc:picChg>
+        <pc:picChg chg="add mod">
+          <ac:chgData name="YUE, Ka Leung" userId="541129f1-78f9-4b79-9dd5-c893242432f5" providerId="ADAL" clId="{854AE85A-E9C8-4BEA-88D8-4A6ACEAD765F}" dt="2024-11-12T09:29:45.669" v="680" actId="1035"/>
+          <ac:picMkLst>
+            <pc:docMk/>
+            <pc:sldMk cId="3102949145" sldId="258"/>
+            <ac:picMk id="1026" creationId="{6DF05A8F-9484-7131-4E78-BADB49DBEA41}"/>
+          </ac:picMkLst>
+        </pc:picChg>
         <pc:picChg chg="mod">
-          <ac:chgData name="YUE, Ka Leung" userId="541129f1-78f9-4b79-9dd5-c893242432f5" providerId="ADAL" clId="{854AE85A-E9C8-4BEA-88D8-4A6ACEAD765F}" dt="2024-11-05T04:01:47.106" v="31" actId="1038"/>
+          <ac:chgData name="YUE, Ka Leung" userId="541129f1-78f9-4b79-9dd5-c893242432f5" providerId="ADAL" clId="{854AE85A-E9C8-4BEA-88D8-4A6ACEAD765F}" dt="2024-11-12T09:24:24.833" v="588" actId="1076"/>
           <ac:picMkLst>
             <pc:docMk/>
             <pc:sldMk cId="3102949145" sldId="258"/>
             <ac:picMk id="3076" creationId="{1D3F9191-A720-49F1-CC0A-B9C1DC7F8AB6}"/>
           </ac:picMkLst>
         </pc:picChg>
+        <pc:inkChg chg="add del">
+          <ac:chgData name="YUE, Ka Leung" userId="541129f1-78f9-4b79-9dd5-c893242432f5" providerId="ADAL" clId="{854AE85A-E9C8-4BEA-88D8-4A6ACEAD765F}" dt="2024-11-12T09:24:42.402" v="590" actId="9405"/>
+          <ac:inkMkLst>
+            <pc:docMk/>
+            <pc:sldMk cId="3102949145" sldId="258"/>
+            <ac:inkMk id="4" creationId="{614545C8-ABCC-92D8-B16D-443B7FA070CD}"/>
+          </ac:inkMkLst>
+        </pc:inkChg>
+        <pc:inkChg chg="add del">
+          <ac:chgData name="YUE, Ka Leung" userId="541129f1-78f9-4b79-9dd5-c893242432f5" providerId="ADAL" clId="{854AE85A-E9C8-4BEA-88D8-4A6ACEAD765F}" dt="2024-11-12T09:25:09.315" v="592" actId="9405"/>
+          <ac:inkMkLst>
+            <pc:docMk/>
+            <pc:sldMk cId="3102949145" sldId="258"/>
+            <ac:inkMk id="5" creationId="{AA4E15C8-DDA8-633C-0536-AF4CC387B40C}"/>
+          </ac:inkMkLst>
+        </pc:inkChg>
+        <pc:inkChg chg="add del">
+          <ac:chgData name="YUE, Ka Leung" userId="541129f1-78f9-4b79-9dd5-c893242432f5" providerId="ADAL" clId="{854AE85A-E9C8-4BEA-88D8-4A6ACEAD765F}" dt="2024-11-12T09:25:16.859" v="594" actId="9405"/>
+          <ac:inkMkLst>
+            <pc:docMk/>
+            <pc:sldMk cId="3102949145" sldId="258"/>
+            <ac:inkMk id="6" creationId="{5A5953B6-B3D0-BEAB-4B95-ECEA25B822A3}"/>
+          </ac:inkMkLst>
+        </pc:inkChg>
+        <pc:inkChg chg="add">
+          <ac:chgData name="YUE, Ka Leung" userId="541129f1-78f9-4b79-9dd5-c893242432f5" providerId="ADAL" clId="{854AE85A-E9C8-4BEA-88D8-4A6ACEAD765F}" dt="2024-11-12T09:25:21.202" v="595" actId="9405"/>
+          <ac:inkMkLst>
+            <pc:docMk/>
+            <pc:sldMk cId="3102949145" sldId="258"/>
+            <ac:inkMk id="8" creationId="{ECBC7614-5E57-3D33-7B74-753078D9AA86}"/>
+          </ac:inkMkLst>
+        </pc:inkChg>
+      </pc:sldChg>
+      <pc:sldChg chg="addSp delSp modSp mod">
+        <pc:chgData name="YUE, Ka Leung" userId="541129f1-78f9-4b79-9dd5-c893242432f5" providerId="ADAL" clId="{854AE85A-E9C8-4BEA-88D8-4A6ACEAD765F}" dt="2024-11-12T10:14:22.226" v="974" actId="478"/>
+        <pc:sldMkLst>
+          <pc:docMk/>
+          <pc:sldMk cId="3061954038" sldId="259"/>
+        </pc:sldMkLst>
+        <pc:spChg chg="mod">
+          <ac:chgData name="YUE, Ka Leung" userId="541129f1-78f9-4b79-9dd5-c893242432f5" providerId="ADAL" clId="{854AE85A-E9C8-4BEA-88D8-4A6ACEAD765F}" dt="2024-11-12T08:46:32.619" v="100" actId="20577"/>
+          <ac:spMkLst>
+            <pc:docMk/>
+            <pc:sldMk cId="3061954038" sldId="259"/>
+            <ac:spMk id="2" creationId="{9AC3CE54-9EE7-0EB8-084A-37D13930B715}"/>
+          </ac:spMkLst>
+        </pc:spChg>
+        <pc:spChg chg="mod">
+          <ac:chgData name="YUE, Ka Leung" userId="541129f1-78f9-4b79-9dd5-c893242432f5" providerId="ADAL" clId="{854AE85A-E9C8-4BEA-88D8-4A6ACEAD765F}" dt="2024-11-12T09:51:34.817" v="971" actId="14100"/>
+          <ac:spMkLst>
+            <pc:docMk/>
+            <pc:sldMk cId="3061954038" sldId="259"/>
+            <ac:spMk id="3" creationId="{51D9DE7A-0F75-77AD-0B59-F445955C7F8B}"/>
+          </ac:spMkLst>
+        </pc:spChg>
+        <pc:picChg chg="add del">
+          <ac:chgData name="YUE, Ka Leung" userId="541129f1-78f9-4b79-9dd5-c893242432f5" providerId="ADAL" clId="{854AE85A-E9C8-4BEA-88D8-4A6ACEAD765F}" dt="2024-11-12T09:34:01.894" v="731" actId="22"/>
+          <ac:picMkLst>
+            <pc:docMk/>
+            <pc:sldMk cId="3061954038" sldId="259"/>
+            <ac:picMk id="5" creationId="{73B37E4E-3675-66CA-12F0-E5B87FAB8543}"/>
+          </ac:picMkLst>
+        </pc:picChg>
+        <pc:picChg chg="add del mod">
+          <ac:chgData name="YUE, Ka Leung" userId="541129f1-78f9-4b79-9dd5-c893242432f5" providerId="ADAL" clId="{854AE85A-E9C8-4BEA-88D8-4A6ACEAD765F}" dt="2024-11-12T10:14:22.226" v="974" actId="478"/>
+          <ac:picMkLst>
+            <pc:docMk/>
+            <pc:sldMk cId="3061954038" sldId="259"/>
+            <ac:picMk id="7" creationId="{51FD09E3-57E8-B07D-0CC7-C7F79CEC166E}"/>
+          </ac:picMkLst>
+        </pc:picChg>
       </pc:sldChg>
     </pc:docChg>
   </pc:docChgLst>
 </pc:chgInfo>
+</file>
+
+<file path=ppt/ink/ink1.xml><?xml version="1.0" encoding="utf-8"?>
+<inkml:ink xmlns:inkml="http://www.w3.org/2003/InkML">
+  <inkml:definitions>
+    <inkml:context xml:id="ctx0">
+      <inkml:inkSource xml:id="inkSrc0">
+        <inkml:traceFormat>
+          <inkml:channel name="X" type="integer" min="-2.14748E9" max="2.14748E9" units="cm"/>
+          <inkml:channel name="Y" type="integer" min="-2.14748E9" max="2.14748E9" units="cm"/>
+        </inkml:traceFormat>
+        <inkml:channelProperties>
+          <inkml:channelProperty channel="X" name="resolution" value="1000" units="1/cm"/>
+          <inkml:channelProperty channel="Y" name="resolution" value="1000" units="1/cm"/>
+        </inkml:channelProperties>
+      </inkml:inkSource>
+      <inkml:timestamp xml:id="ts0" timeString="2024-11-12T09:25:21.202"/>
+    </inkml:context>
+    <inkml:brush xml:id="br0">
+      <inkml:brushProperty name="width" value="0.3" units="cm"/>
+      <inkml:brushProperty name="height" value="0.6" units="cm"/>
+      <inkml:brushProperty name="color" value="#FFFC00"/>
+      <inkml:brushProperty name="tip" value="rectangle"/>
+      <inkml:brushProperty name="rasterOp" value="maskPen"/>
+      <inkml:brushProperty name="ignorePressure" value="1"/>
+    </inkml:brush>
+  </inkml:definitions>
+  <inkml:trace contextRef="#ctx0" brushRef="#br0">1552 18,'-96'7,"30"-6,-226-2,271-1,-31-6,32 4,1 1,-22-1,-44 2,-100 0,95 3,54-1,-38 1,69-1,-1 1,1 1,0-1,-6 3,-16 4,-3-5,-58-1,57-2,-52 5,49-2,-65-2,51-2,45 1</inkml:trace>
+</inkml:ink>
 </file>
 
 <file path=ppt/notesMasters/notesMaster1.xml><?xml version="1.0" encoding="utf-8"?>
@@ -356,7 +502,7 @@
           <a:p>
             <a:fld id="{A27C1D88-EBBB-43A8-B253-9AED204A1F7E}" type="datetimeFigureOut">
               <a:rPr lang="zh-HK" altLang="en-US" smtClean="0"/>
-              <a:t>5/11/2024</a:t>
+              <a:t>12/11/2024</a:t>
             </a:fld>
             <a:endParaRPr lang="zh-HK" altLang="en-US"/>
           </a:p>
@@ -893,7 +1039,7 @@
           <a:p>
             <a:fld id="{CACF5AB0-79F4-49E7-8FAC-9523C7F791E9}" type="datetimeFigureOut">
               <a:rPr lang="zh-HK" altLang="en-US" smtClean="0"/>
-              <a:t>5/11/2024</a:t>
+              <a:t>12/11/2024</a:t>
             </a:fld>
             <a:endParaRPr lang="zh-HK" altLang="en-US"/>
           </a:p>
@@ -1191,7 +1337,7 @@
           <a:p>
             <a:fld id="{CACF5AB0-79F4-49E7-8FAC-9523C7F791E9}" type="datetimeFigureOut">
               <a:rPr lang="zh-HK" altLang="en-US" smtClean="0"/>
-              <a:t>5/11/2024</a:t>
+              <a:t>12/11/2024</a:t>
             </a:fld>
             <a:endParaRPr lang="zh-HK" altLang="en-US"/>
           </a:p>
@@ -1383,7 +1529,7 @@
           <a:p>
             <a:fld id="{CACF5AB0-79F4-49E7-8FAC-9523C7F791E9}" type="datetimeFigureOut">
               <a:rPr lang="zh-HK" altLang="en-US" smtClean="0"/>
-              <a:t>5/11/2024</a:t>
+              <a:t>12/11/2024</a:t>
             </a:fld>
             <a:endParaRPr lang="zh-HK" altLang="en-US"/>
           </a:p>
@@ -1644,7 +1790,7 @@
           <a:p>
             <a:fld id="{CACF5AB0-79F4-49E7-8FAC-9523C7F791E9}" type="datetimeFigureOut">
               <a:rPr lang="zh-HK" altLang="en-US" smtClean="0"/>
-              <a:t>5/11/2024</a:t>
+              <a:t>12/11/2024</a:t>
             </a:fld>
             <a:endParaRPr lang="zh-HK" altLang="en-US"/>
           </a:p>
@@ -2068,7 +2214,7 @@
           <a:p>
             <a:fld id="{CACF5AB0-79F4-49E7-8FAC-9523C7F791E9}" type="datetimeFigureOut">
               <a:rPr lang="zh-HK" altLang="en-US" smtClean="0"/>
-              <a:t>5/11/2024</a:t>
+              <a:t>12/11/2024</a:t>
             </a:fld>
             <a:endParaRPr lang="zh-HK" altLang="en-US"/>
           </a:p>
@@ -2605,7 +2751,7 @@
           <a:p>
             <a:fld id="{CACF5AB0-79F4-49E7-8FAC-9523C7F791E9}" type="datetimeFigureOut">
               <a:rPr lang="zh-HK" altLang="en-US" smtClean="0"/>
-              <a:t>5/11/2024</a:t>
+              <a:t>12/11/2024</a:t>
             </a:fld>
             <a:endParaRPr lang="zh-HK" altLang="en-US"/>
           </a:p>
@@ -3469,7 +3615,7 @@
           <a:p>
             <a:fld id="{CACF5AB0-79F4-49E7-8FAC-9523C7F791E9}" type="datetimeFigureOut">
               <a:rPr lang="zh-HK" altLang="en-US" smtClean="0"/>
-              <a:t>5/11/2024</a:t>
+              <a:t>12/11/2024</a:t>
             </a:fld>
             <a:endParaRPr lang="zh-HK" altLang="en-US"/>
           </a:p>
@@ -3639,7 +3785,7 @@
           <a:p>
             <a:fld id="{CACF5AB0-79F4-49E7-8FAC-9523C7F791E9}" type="datetimeFigureOut">
               <a:rPr lang="zh-HK" altLang="en-US" smtClean="0"/>
-              <a:t>5/11/2024</a:t>
+              <a:t>12/11/2024</a:t>
             </a:fld>
             <a:endParaRPr lang="zh-HK" altLang="en-US"/>
           </a:p>
@@ -3823,7 +3969,7 @@
           <a:p>
             <a:fld id="{CACF5AB0-79F4-49E7-8FAC-9523C7F791E9}" type="datetimeFigureOut">
               <a:rPr lang="zh-HK" altLang="en-US" smtClean="0"/>
-              <a:t>5/11/2024</a:t>
+              <a:t>12/11/2024</a:t>
             </a:fld>
             <a:endParaRPr lang="zh-HK" altLang="en-US"/>
           </a:p>
@@ -3993,7 +4139,7 @@
           <a:p>
             <a:fld id="{CACF5AB0-79F4-49E7-8FAC-9523C7F791E9}" type="datetimeFigureOut">
               <a:rPr lang="zh-HK" altLang="en-US" smtClean="0"/>
-              <a:t>5/11/2024</a:t>
+              <a:t>12/11/2024</a:t>
             </a:fld>
             <a:endParaRPr lang="zh-HK" altLang="en-US"/>
           </a:p>
@@ -4237,7 +4383,7 @@
           <a:p>
             <a:fld id="{CACF5AB0-79F4-49E7-8FAC-9523C7F791E9}" type="datetimeFigureOut">
               <a:rPr lang="zh-HK" altLang="en-US" smtClean="0"/>
-              <a:t>5/11/2024</a:t>
+              <a:t>12/11/2024</a:t>
             </a:fld>
             <a:endParaRPr lang="zh-HK" altLang="en-US"/>
           </a:p>
@@ -4473,7 +4619,7 @@
           <a:p>
             <a:fld id="{CACF5AB0-79F4-49E7-8FAC-9523C7F791E9}" type="datetimeFigureOut">
               <a:rPr lang="zh-HK" altLang="en-US" smtClean="0"/>
-              <a:t>5/11/2024</a:t>
+              <a:t>12/11/2024</a:t>
             </a:fld>
             <a:endParaRPr lang="zh-HK" altLang="en-US"/>
           </a:p>
@@ -4939,7 +5085,7 @@
           <a:p>
             <a:fld id="{CACF5AB0-79F4-49E7-8FAC-9523C7F791E9}" type="datetimeFigureOut">
               <a:rPr lang="zh-HK" altLang="en-US" smtClean="0"/>
-              <a:t>5/11/2024</a:t>
+              <a:t>12/11/2024</a:t>
             </a:fld>
             <a:endParaRPr lang="zh-HK" altLang="en-US"/>
           </a:p>
@@ -5057,7 +5203,7 @@
           <a:p>
             <a:fld id="{CACF5AB0-79F4-49E7-8FAC-9523C7F791E9}" type="datetimeFigureOut">
               <a:rPr lang="zh-HK" altLang="en-US" smtClean="0"/>
-              <a:t>5/11/2024</a:t>
+              <a:t>12/11/2024</a:t>
             </a:fld>
             <a:endParaRPr lang="zh-HK" altLang="en-US"/>
           </a:p>
@@ -5152,7 +5298,7 @@
           <a:p>
             <a:fld id="{CACF5AB0-79F4-49E7-8FAC-9523C7F791E9}" type="datetimeFigureOut">
               <a:rPr lang="zh-HK" altLang="en-US" smtClean="0"/>
-              <a:t>5/11/2024</a:t>
+              <a:t>12/11/2024</a:t>
             </a:fld>
             <a:endParaRPr lang="zh-HK" altLang="en-US"/>
           </a:p>
@@ -5407,7 +5553,7 @@
           <a:p>
             <a:fld id="{CACF5AB0-79F4-49E7-8FAC-9523C7F791E9}" type="datetimeFigureOut">
               <a:rPr lang="zh-HK" altLang="en-US" smtClean="0"/>
-              <a:t>5/11/2024</a:t>
+              <a:t>12/11/2024</a:t>
             </a:fld>
             <a:endParaRPr lang="zh-HK" altLang="en-US"/>
           </a:p>
@@ -5707,7 +5853,7 @@
           <a:p>
             <a:fld id="{CACF5AB0-79F4-49E7-8FAC-9523C7F791E9}" type="datetimeFigureOut">
               <a:rPr lang="zh-HK" altLang="en-US" smtClean="0"/>
-              <a:t>5/11/2024</a:t>
+              <a:t>12/11/2024</a:t>
             </a:fld>
             <a:endParaRPr lang="zh-HK" altLang="en-US"/>
           </a:p>
@@ -5941,7 +6087,7 @@
           <a:p>
             <a:fld id="{CACF5AB0-79F4-49E7-8FAC-9523C7F791E9}" type="datetimeFigureOut">
               <a:rPr lang="zh-HK" altLang="en-US" smtClean="0"/>
-              <a:t>5/11/2024</a:t>
+              <a:t>12/11/2024</a:t>
             </a:fld>
             <a:endParaRPr lang="zh-HK" altLang="en-US"/>
           </a:p>
@@ -6763,7 +6909,7 @@
         <p:spPr/>
         <p:txBody>
           <a:bodyPr>
-            <a:normAutofit lnSpcReduction="10000"/>
+            <a:normAutofit fontScale="92500" lnSpcReduction="20000"/>
           </a:bodyPr>
           <a:lstStyle/>
           <a:p>
@@ -7052,6 +7198,12 @@
           <a:p>
             <a:pPr lvl="1"/>
             <a:endParaRPr lang="en-US" altLang="zh-HK" dirty="0"/>
+          </a:p>
+          <a:p>
+            <a:r>
+              <a:rPr lang="en-US" altLang="zh-HK" dirty="0"/>
+              <a:t>The word vectors depend on the words frequently appearing near the word in the data.</a:t>
+            </a:r>
           </a:p>
           <a:p>
             <a:r>
@@ -7100,7 +7252,7 @@
         </p:blipFill>
         <p:spPr bwMode="auto">
           <a:xfrm>
-            <a:off x="6640424" y="2212394"/>
+            <a:off x="6640424" y="1942097"/>
             <a:ext cx="5156241" cy="2750413"/>
           </a:xfrm>
           <a:prstGeom prst="rect">
@@ -7177,8 +7329,8 @@
           </a:p>
         </p:txBody>
       </p:sp>
-      <mc:AlternateContent xmlns:mc="http://schemas.openxmlformats.org/markup-compatibility/2006" xmlns:a14="http://schemas.microsoft.com/office/drawing/2010/main">
-        <mc:Choice Requires="a14">
+      <mc:AlternateContent xmlns:mc="http://schemas.openxmlformats.org/markup-compatibility/2006">
+        <mc:Choice xmlns:a14="http://schemas.microsoft.com/office/drawing/2010/main" Requires="a14">
           <p:sp>
             <p:nvSpPr>
               <p:cNvPr id="3" name="內容版面配置區 2">
@@ -7203,7 +7355,7 @@
             </p:spPr>
             <p:txBody>
               <a:bodyPr>
-                <a:normAutofit fontScale="70000" lnSpcReduction="20000"/>
+                <a:normAutofit fontScale="62500" lnSpcReduction="20000"/>
               </a:bodyPr>
               <a:lstStyle/>
               <a:p>
@@ -7813,13 +7965,51 @@
                       <a:srgbClr val="FFC000"/>
                     </a:solidFill>
                   </a:rPr>
-                  <a:t>Probability of words appearing together</a:t>
+                  <a:t>Probability of words appearing together in the data </a:t>
                 </a:r>
-                <a:endParaRPr lang="en-US" altLang="zh-HK" dirty="0">
+                <a:r>
+                  <a:rPr lang="en-US" altLang="zh-HK" u="sng" dirty="0">
+                    <a:solidFill>
+                      <a:srgbClr val="FFC000"/>
+                    </a:solidFill>
+                    <a:sym typeface="Wingdings" panose="05000000000000000000" pitchFamily="2" charset="2"/>
+                  </a:rPr>
+                  <a:t> semantic meanings</a:t>
+                </a:r>
+                <a:endParaRPr lang="en-US" altLang="zh-HK" u="sng" dirty="0">
                   <a:solidFill>
-                    <a:schemeClr val="tx1"/>
+                    <a:srgbClr val="FFC000"/>
                   </a:solidFill>
                 </a:endParaRPr>
+              </a:p>
+              <a:p>
+                <a:pPr lvl="1"/>
+                <a:r>
+                  <a:rPr lang="en-US" altLang="zh-HK" dirty="0">
+                    <a:solidFill>
+                      <a:schemeClr val="tx1"/>
+                    </a:solidFill>
+                  </a:rPr>
+                  <a:t>The word vectors are continuously adjusted to </a:t>
+                </a:r>
+                <a:r>
+                  <a:rPr lang="en-US" altLang="zh-HK" dirty="0">
+                    <a:solidFill>
+                      <a:schemeClr val="accent2">
+                        <a:lumMod val="75000"/>
+                      </a:schemeClr>
+                    </a:solidFill>
+                  </a:rPr>
+                  <a:t>maximize</a:t>
+                </a:r>
+                <a:r>
+                  <a:rPr lang="en-US" altLang="zh-HK" dirty="0">
+                    <a:solidFill>
+                      <a:schemeClr val="tx1"/>
+                    </a:solidFill>
+                  </a:rPr>
+                  <a:t> this probability.</a:t>
+                </a:r>
               </a:p>
               <a:p>
                 <a:pPr lvl="1"/>
@@ -8186,7 +8376,7 @@
             </p:txBody>
           </p:sp>
         </mc:Choice>
-        <mc:Fallback xmlns="">
+        <mc:Fallback>
           <p:sp>
             <p:nvSpPr>
               <p:cNvPr id="3" name="內容版面配置區 2">
@@ -8299,7 +8489,7 @@
         </p:blipFill>
         <p:spPr>
           <a:xfrm>
-            <a:off x="3481381" y="4711148"/>
+            <a:off x="3481381" y="4694819"/>
             <a:ext cx="486458" cy="454162"/>
           </a:xfrm>
           <a:prstGeom prst="rect">
@@ -8329,7 +8519,7 @@
         </p:blipFill>
         <p:spPr>
           <a:xfrm>
-            <a:off x="4413407" y="2835046"/>
+            <a:off x="4366475" y="2725777"/>
             <a:ext cx="2509907" cy="787684"/>
           </a:xfrm>
           <a:prstGeom prst="rect">
@@ -8337,6 +8527,104 @@
           </a:prstGeom>
         </p:spPr>
       </p:pic>
+      <p:pic>
+        <p:nvPicPr>
+          <p:cNvPr id="1026" name="Picture 2" descr="Softmax Function: Advantages and Applications | BotPenguin">
+            <a:extLst>
+              <a:ext uri="{FF2B5EF4-FFF2-40B4-BE49-F238E27FC236}">
+                <a16:creationId xmlns:a16="http://schemas.microsoft.com/office/drawing/2014/main" id="{6DF05A8F-9484-7131-4E78-BADB49DBEA41}"/>
+              </a:ext>
+            </a:extLst>
+          </p:cNvPr>
+          <p:cNvPicPr>
+            <a:picLocks noChangeAspect="1" noChangeArrowheads="1"/>
+          </p:cNvPicPr>
+          <p:nvPr/>
+        </p:nvPicPr>
+        <p:blipFill>
+          <a:blip r:embed="rId7">
+            <a:extLst>
+              <a:ext uri="{28A0092B-C50C-407E-A947-70E740481C1C}">
+                <a14:useLocalDpi xmlns:a14="http://schemas.microsoft.com/office/drawing/2010/main" val="0"/>
+              </a:ext>
+            </a:extLst>
+          </a:blip>
+          <a:srcRect/>
+          <a:stretch>
+            <a:fillRect/>
+          </a:stretch>
+        </p:blipFill>
+        <p:spPr bwMode="auto">
+          <a:xfrm>
+            <a:off x="6086288" y="3575080"/>
+            <a:ext cx="787684" cy="787684"/>
+          </a:xfrm>
+          <a:prstGeom prst="rect">
+            <a:avLst/>
+          </a:prstGeom>
+          <a:noFill/>
+          <a:extLst>
+            <a:ext uri="{909E8E84-426E-40DD-AFC4-6F175D3DCCD1}">
+              <a14:hiddenFill xmlns:a14="http://schemas.microsoft.com/office/drawing/2010/main">
+                <a:solidFill>
+                  <a:srgbClr val="FFFFFF"/>
+                </a:solidFill>
+              </a14:hiddenFill>
+            </a:ext>
+          </a:extLst>
+        </p:spPr>
+      </p:pic>
+      <mc:AlternateContent xmlns:mc="http://schemas.openxmlformats.org/markup-compatibility/2006">
+        <mc:Choice xmlns:p14="http://schemas.microsoft.com/office/powerpoint/2010/main" Requires="p14">
+          <p:contentPart p14:bwMode="auto" r:id="rId8">
+            <p14:nvContentPartPr>
+              <p14:cNvPr id="8" name="Ink 7">
+                <a:extLst>
+                  <a:ext uri="{FF2B5EF4-FFF2-40B4-BE49-F238E27FC236}">
+                    <a16:creationId xmlns:a16="http://schemas.microsoft.com/office/drawing/2014/main" id="{ECBC7614-5E57-3D33-7B74-753078D9AA86}"/>
+                  </a:ext>
+                </a:extLst>
+              </p14:cNvPr>
+              <p14:cNvContentPartPr/>
+              <p14:nvPr/>
+            </p14:nvContentPartPr>
+            <p14:xfrm>
+              <a:off x="10228206" y="4841741"/>
+              <a:ext cx="559080" cy="11880"/>
+            </p14:xfrm>
+          </p:contentPart>
+        </mc:Choice>
+        <mc:Fallback>
+          <p:pic>
+            <p:nvPicPr>
+              <p:cNvPr id="8" name="Ink 7">
+                <a:extLst>
+                  <a:ext uri="{FF2B5EF4-FFF2-40B4-BE49-F238E27FC236}">
+                    <a16:creationId xmlns:a16="http://schemas.microsoft.com/office/drawing/2014/main" id="{ECBC7614-5E57-3D33-7B74-753078D9AA86}"/>
+                  </a:ext>
+                </a:extLst>
+              </p:cNvPr>
+              <p:cNvPicPr/>
+              <p:nvPr/>
+            </p:nvPicPr>
+            <p:blipFill>
+              <a:blip r:embed="rId9"/>
+              <a:stretch>
+                <a:fillRect/>
+              </a:stretch>
+            </p:blipFill>
+            <p:spPr>
+              <a:xfrm>
+                <a:off x="10174206" y="4733741"/>
+                <a:ext cx="666720" cy="227520"/>
+              </a:xfrm>
+              <a:prstGeom prst="rect">
+                <a:avLst/>
+              </a:prstGeom>
+            </p:spPr>
+          </p:pic>
+        </mc:Fallback>
+      </mc:AlternateContent>
     </p:spTree>
     <p:extLst>
       <p:ext uri="{BB962C8B-B14F-4D97-AF65-F5344CB8AC3E}">
@@ -8390,7 +8678,7 @@
           <a:p>
             <a:r>
               <a:rPr lang="en-US" altLang="zh-HK" dirty="0"/>
-              <a:t>Code implementation of the Skip-Gram model</a:t>
+              <a:t>Code implementation</a:t>
             </a:r>
             <a:endParaRPr lang="zh-HK" altLang="en-US" dirty="0"/>
           </a:p>
@@ -8412,14 +8700,62 @@
             <p:ph idx="1"/>
           </p:nvPr>
         </p:nvSpPr>
-        <p:spPr/>
+        <p:spPr>
+          <a:xfrm>
+            <a:off x="913795" y="1732449"/>
+            <a:ext cx="7021891" cy="4058751"/>
+          </a:xfrm>
+        </p:spPr>
         <p:txBody>
           <a:bodyPr/>
           <a:lstStyle/>
           <a:p>
             <a:r>
               <a:rPr lang="en-US" altLang="zh-HK" dirty="0"/>
-              <a:t>We do not have the data to train a model so we are going to use </a:t>
+              <a:t>Implementing a basic Skip-Gram model:</a:t>
+            </a:r>
+          </a:p>
+          <a:p>
+            <a:endParaRPr lang="en-US" altLang="zh-HK" dirty="0"/>
+          </a:p>
+          <a:p>
+            <a:r>
+              <a:rPr lang="en-US" altLang="zh-HK" dirty="0"/>
+              <a:t>Using</a:t>
+            </a:r>
+            <a:r>
+              <a:rPr lang="zh-TW" altLang="en-US" dirty="0"/>
+              <a:t> </a:t>
+            </a:r>
+            <a:r>
+              <a:rPr lang="en-US" altLang="zh-TW" dirty="0"/>
+              <a:t>a</a:t>
+            </a:r>
+            <a:r>
+              <a:rPr lang="zh-TW" altLang="en-US" dirty="0"/>
+              <a:t> </a:t>
+            </a:r>
+            <a:r>
+              <a:rPr lang="en-US" altLang="zh-TW" dirty="0"/>
+              <a:t>pre-trained</a:t>
+            </a:r>
+            <a:r>
+              <a:rPr lang="zh-TW" altLang="en-US" dirty="0"/>
+              <a:t> </a:t>
+            </a:r>
+            <a:r>
+              <a:rPr lang="en-US" altLang="zh-TW" dirty="0"/>
+              <a:t>model:</a:t>
+            </a:r>
+            <a:endParaRPr lang="en-US" altLang="zh-HK" dirty="0"/>
+          </a:p>
+          <a:p>
+            <a:endParaRPr lang="en-US" altLang="zh-HK" dirty="0"/>
+          </a:p>
+          <a:p>
+            <a:r>
+              <a:rPr lang="en-US" altLang="zh-HK" dirty="0"/>
+              <a:t>Please visit </a:t>
             </a:r>
             <a:r>
               <a:rPr lang="en-US" altLang="zh-HK" dirty="0">
@@ -8434,96 +8770,15 @@
                   </a:extLst>
                 </a:hlinkClick>
               </a:rPr>
-              <a:t>the pre-trained model</a:t>
-            </a:r>
-            <a:r>
-              <a:rPr lang="en-US" altLang="zh-HK" dirty="0">
-                <a:solidFill>
-                  <a:srgbClr val="B5D3FF"/>
-                </a:solidFill>
-              </a:rPr>
-              <a:t> </a:t>
+              <a:t>the GitHub Repository</a:t>
             </a:r>
             <a:r>
               <a:rPr lang="en-US" altLang="zh-HK" dirty="0"/>
-              <a:t>from </a:t>
-            </a:r>
-            <a:r>
-              <a:rPr lang="en-US" altLang="zh-HK" dirty="0">
-                <a:solidFill>
-                  <a:srgbClr val="A9C3EB"/>
-                </a:solidFill>
-                <a:hlinkClick r:id="rId3">
-                  <a:extLst>
-                    <a:ext uri="{A12FA001-AC4F-418D-AE19-62706E023703}">
-                      <ahyp:hlinkClr xmlns:ahyp="http://schemas.microsoft.com/office/drawing/2018/hyperlinkcolor" val="tx"/>
-                    </a:ext>
-                  </a:extLst>
-                </a:hlinkClick>
-              </a:rPr>
-              <a:t>Google Word2Vec</a:t>
-            </a:r>
-            <a:r>
-              <a:rPr lang="en-US" altLang="zh-HK" dirty="0"/>
-              <a:t>.</a:t>
-            </a:r>
-          </a:p>
-          <a:p>
-            <a:pPr lvl="1"/>
-            <a:r>
-              <a:rPr lang="en-US" altLang="zh-HK" dirty="0"/>
-              <a:t>We code in </a:t>
-            </a:r>
-            <a:r>
-              <a:rPr lang="en-US" altLang="zh-HK" dirty="0">
-                <a:solidFill>
-                  <a:srgbClr val="FFC000"/>
-                </a:solidFill>
-              </a:rPr>
-              <a:t>Python</a:t>
-            </a:r>
-            <a:r>
-              <a:rPr lang="en-US" altLang="zh-HK" dirty="0"/>
-              <a:t> and make use of the </a:t>
-            </a:r>
-            <a:r>
-              <a:rPr lang="en-US" altLang="zh-HK" dirty="0" err="1">
-                <a:solidFill>
-                  <a:srgbClr val="AE78D6"/>
-                </a:solidFill>
-              </a:rPr>
-              <a:t>Gensim</a:t>
-            </a:r>
-            <a:r>
-              <a:rPr lang="en-US" altLang="zh-HK" dirty="0"/>
-              <a:t> library.</a:t>
-            </a:r>
-          </a:p>
-          <a:p>
-            <a:pPr lvl="1"/>
-            <a:r>
-              <a:rPr lang="en-US" altLang="zh-HK" dirty="0"/>
-              <a:t>Visit </a:t>
-            </a:r>
-            <a:r>
-              <a:rPr lang="en-US" altLang="zh-HK" dirty="0">
-                <a:solidFill>
-                  <a:srgbClr val="A9C3EB"/>
-                </a:solidFill>
-                <a:hlinkClick r:id="rId4">
-                  <a:extLst>
-                    <a:ext uri="{A12FA001-AC4F-418D-AE19-62706E023703}">
-                      <ahyp:hlinkClr xmlns:ahyp="http://schemas.microsoft.com/office/drawing/2018/hyperlinkcolor" val="tx"/>
-                    </a:ext>
-                  </a:extLst>
-                </a:hlinkClick>
-              </a:rPr>
-              <a:t>the GitHub Repository</a:t>
-            </a:r>
-            <a:r>
-              <a:rPr lang="en-US" altLang="zh-HK" dirty="0"/>
-              <a:t> to read and download the full source code.</a:t>
-            </a:r>
+              <a:t> to read the more detailed explanation and download the full source code. Thank you.</a:t>
+            </a:r>
+          </a:p>
+          <a:p>
+            <a:endParaRPr lang="en-US" altLang="zh-HK" dirty="0"/>
           </a:p>
         </p:txBody>
       </p:sp>

</xml_diff>

<commit_message>
small updates to script and pptx
</commit_message>
<xml_diff>
--- a/Presentation.pptx
+++ b/Presentation.pptx
@@ -121,179 +121,13 @@
 <file path=ppt/revisionInfo.xml><?xml version="1.0" encoding="utf-8"?>
 <p1510:revInfo xmlns:a="http://schemas.openxmlformats.org/drawingml/2006/main" xmlns:r="http://schemas.openxmlformats.org/officeDocument/2006/relationships" xmlns:p1510="http://schemas.microsoft.com/office/powerpoint/2015/10/main">
   <p1510:revLst>
-    <p1510:client id="{854AE85A-E9C8-4BEA-88D8-4A6ACEAD765F}" v="78" dt="2024-11-12T09:29:45.669"/>
+    <p1510:client id="{854AE85A-E9C8-4BEA-88D8-4A6ACEAD765F}" v="116" dt="2024-11-18T03:18:19.541"/>
   </p1510:revLst>
 </p1510:revInfo>
 </file>
 
 <file path=ppt/changesInfos/changesInfo1.xml><?xml version="1.0" encoding="utf-8"?>
 <pc:chgInfo xmlns:a="http://schemas.openxmlformats.org/drawingml/2006/main" xmlns:r="http://schemas.openxmlformats.org/officeDocument/2006/relationships" xmlns:ac="http://schemas.microsoft.com/office/drawing/2013/main/command" xmlns:pc="http://schemas.microsoft.com/office/powerpoint/2013/main/command">
-  <pc:docChgLst>
-    <pc:chgData name="YUE, Ka Leung" userId="541129f1-78f9-4b79-9dd5-c893242432f5" providerId="ADAL" clId="{854AE85A-E9C8-4BEA-88D8-4A6ACEAD765F}"/>
-    <pc:docChg chg="undo redo custSel modSld">
-      <pc:chgData name="YUE, Ka Leung" userId="541129f1-78f9-4b79-9dd5-c893242432f5" providerId="ADAL" clId="{854AE85A-E9C8-4BEA-88D8-4A6ACEAD765F}" dt="2024-11-12T10:14:22.226" v="974" actId="478"/>
-      <pc:docMkLst>
-        <pc:docMk/>
-      </pc:docMkLst>
-      <pc:sldChg chg="modSp mod">
-        <pc:chgData name="YUE, Ka Leung" userId="541129f1-78f9-4b79-9dd5-c893242432f5" providerId="ADAL" clId="{854AE85A-E9C8-4BEA-88D8-4A6ACEAD765F}" dt="2024-11-12T09:07:17.633" v="540" actId="20577"/>
-        <pc:sldMkLst>
-          <pc:docMk/>
-          <pc:sldMk cId="2374378964" sldId="257"/>
-        </pc:sldMkLst>
-        <pc:spChg chg="mod">
-          <ac:chgData name="YUE, Ka Leung" userId="541129f1-78f9-4b79-9dd5-c893242432f5" providerId="ADAL" clId="{854AE85A-E9C8-4BEA-88D8-4A6ACEAD765F}" dt="2024-11-12T09:07:17.633" v="540" actId="20577"/>
-          <ac:spMkLst>
-            <pc:docMk/>
-            <pc:sldMk cId="2374378964" sldId="257"/>
-            <ac:spMk id="3" creationId="{58834CCC-396A-83AB-0CEC-E12C15CC31A6}"/>
-          </ac:spMkLst>
-        </pc:spChg>
-        <pc:picChg chg="mod">
-          <ac:chgData name="YUE, Ka Leung" userId="541129f1-78f9-4b79-9dd5-c893242432f5" providerId="ADAL" clId="{854AE85A-E9C8-4BEA-88D8-4A6ACEAD765F}" dt="2024-11-12T08:59:34.340" v="200" actId="1036"/>
-          <ac:picMkLst>
-            <pc:docMk/>
-            <pc:sldMk cId="2374378964" sldId="257"/>
-            <ac:picMk id="2050" creationId="{3353F6F6-2512-3873-893B-1EF077E1A709}"/>
-          </ac:picMkLst>
-        </pc:picChg>
-      </pc:sldChg>
-      <pc:sldChg chg="addSp delSp modSp mod">
-        <pc:chgData name="YUE, Ka Leung" userId="541129f1-78f9-4b79-9dd5-c893242432f5" providerId="ADAL" clId="{854AE85A-E9C8-4BEA-88D8-4A6ACEAD765F}" dt="2024-11-12T09:29:47.493" v="681" actId="1038"/>
-        <pc:sldMkLst>
-          <pc:docMk/>
-          <pc:sldMk cId="3102949145" sldId="258"/>
-        </pc:sldMkLst>
-        <pc:spChg chg="mod">
-          <ac:chgData name="YUE, Ka Leung" userId="541129f1-78f9-4b79-9dd5-c893242432f5" providerId="ADAL" clId="{854AE85A-E9C8-4BEA-88D8-4A6ACEAD765F}" dt="2024-11-12T09:29:36.038" v="672" actId="20577"/>
-          <ac:spMkLst>
-            <pc:docMk/>
-            <pc:sldMk cId="3102949145" sldId="258"/>
-            <ac:spMk id="3" creationId="{87FE9185-727A-05EB-9BBB-ABA356B4242B}"/>
-          </ac:spMkLst>
-        </pc:spChg>
-        <pc:picChg chg="add del mod">
-          <ac:chgData name="YUE, Ka Leung" userId="541129f1-78f9-4b79-9dd5-c893242432f5" providerId="ADAL" clId="{854AE85A-E9C8-4BEA-88D8-4A6ACEAD765F}" dt="2024-11-05T04:01:06.861" v="22" actId="478"/>
-          <ac:picMkLst>
-            <pc:docMk/>
-            <pc:sldMk cId="3102949145" sldId="258"/>
-            <ac:picMk id="5" creationId="{E926B2CB-B774-BEF4-7593-C3F87DD9E52D}"/>
-          </ac:picMkLst>
-        </pc:picChg>
-        <pc:picChg chg="add mod">
-          <ac:chgData name="YUE, Ka Leung" userId="541129f1-78f9-4b79-9dd5-c893242432f5" providerId="ADAL" clId="{854AE85A-E9C8-4BEA-88D8-4A6ACEAD765F}" dt="2024-11-12T09:29:47.493" v="681" actId="1038"/>
-          <ac:picMkLst>
-            <pc:docMk/>
-            <pc:sldMk cId="3102949145" sldId="258"/>
-            <ac:picMk id="7" creationId="{DA3E1BF7-DD86-E526-F8F0-271825B462BD}"/>
-          </ac:picMkLst>
-        </pc:picChg>
-        <pc:picChg chg="mod">
-          <ac:chgData name="YUE, Ka Leung" userId="541129f1-78f9-4b79-9dd5-c893242432f5" providerId="ADAL" clId="{854AE85A-E9C8-4BEA-88D8-4A6ACEAD765F}" dt="2024-11-12T09:28:30.399" v="649" actId="1036"/>
-          <ac:picMkLst>
-            <pc:docMk/>
-            <pc:sldMk cId="3102949145" sldId="258"/>
-            <ac:picMk id="9" creationId="{0C6BC097-7C06-3229-05E1-AA7C21CDD1B9}"/>
-          </ac:picMkLst>
-        </pc:picChg>
-        <pc:picChg chg="del">
-          <ac:chgData name="YUE, Ka Leung" userId="541129f1-78f9-4b79-9dd5-c893242432f5" providerId="ADAL" clId="{854AE85A-E9C8-4BEA-88D8-4A6ACEAD765F}" dt="2024-11-05T03:59:31.213" v="0" actId="478"/>
-          <ac:picMkLst>
-            <pc:docMk/>
-            <pc:sldMk cId="3102949145" sldId="258"/>
-            <ac:picMk id="11" creationId="{E2F116AD-3C1A-6948-CB55-33C36433F3B8}"/>
-          </ac:picMkLst>
-        </pc:picChg>
-        <pc:picChg chg="add mod">
-          <ac:chgData name="YUE, Ka Leung" userId="541129f1-78f9-4b79-9dd5-c893242432f5" providerId="ADAL" clId="{854AE85A-E9C8-4BEA-88D8-4A6ACEAD765F}" dt="2024-11-12T09:29:45.669" v="680" actId="1035"/>
-          <ac:picMkLst>
-            <pc:docMk/>
-            <pc:sldMk cId="3102949145" sldId="258"/>
-            <ac:picMk id="1026" creationId="{6DF05A8F-9484-7131-4E78-BADB49DBEA41}"/>
-          </ac:picMkLst>
-        </pc:picChg>
-        <pc:picChg chg="mod">
-          <ac:chgData name="YUE, Ka Leung" userId="541129f1-78f9-4b79-9dd5-c893242432f5" providerId="ADAL" clId="{854AE85A-E9C8-4BEA-88D8-4A6ACEAD765F}" dt="2024-11-12T09:24:24.833" v="588" actId="1076"/>
-          <ac:picMkLst>
-            <pc:docMk/>
-            <pc:sldMk cId="3102949145" sldId="258"/>
-            <ac:picMk id="3076" creationId="{1D3F9191-A720-49F1-CC0A-B9C1DC7F8AB6}"/>
-          </ac:picMkLst>
-        </pc:picChg>
-        <pc:inkChg chg="add del">
-          <ac:chgData name="YUE, Ka Leung" userId="541129f1-78f9-4b79-9dd5-c893242432f5" providerId="ADAL" clId="{854AE85A-E9C8-4BEA-88D8-4A6ACEAD765F}" dt="2024-11-12T09:24:42.402" v="590" actId="9405"/>
-          <ac:inkMkLst>
-            <pc:docMk/>
-            <pc:sldMk cId="3102949145" sldId="258"/>
-            <ac:inkMk id="4" creationId="{614545C8-ABCC-92D8-B16D-443B7FA070CD}"/>
-          </ac:inkMkLst>
-        </pc:inkChg>
-        <pc:inkChg chg="add del">
-          <ac:chgData name="YUE, Ka Leung" userId="541129f1-78f9-4b79-9dd5-c893242432f5" providerId="ADAL" clId="{854AE85A-E9C8-4BEA-88D8-4A6ACEAD765F}" dt="2024-11-12T09:25:09.315" v="592" actId="9405"/>
-          <ac:inkMkLst>
-            <pc:docMk/>
-            <pc:sldMk cId="3102949145" sldId="258"/>
-            <ac:inkMk id="5" creationId="{AA4E15C8-DDA8-633C-0536-AF4CC387B40C}"/>
-          </ac:inkMkLst>
-        </pc:inkChg>
-        <pc:inkChg chg="add del">
-          <ac:chgData name="YUE, Ka Leung" userId="541129f1-78f9-4b79-9dd5-c893242432f5" providerId="ADAL" clId="{854AE85A-E9C8-4BEA-88D8-4A6ACEAD765F}" dt="2024-11-12T09:25:16.859" v="594" actId="9405"/>
-          <ac:inkMkLst>
-            <pc:docMk/>
-            <pc:sldMk cId="3102949145" sldId="258"/>
-            <ac:inkMk id="6" creationId="{5A5953B6-B3D0-BEAB-4B95-ECEA25B822A3}"/>
-          </ac:inkMkLst>
-        </pc:inkChg>
-        <pc:inkChg chg="add">
-          <ac:chgData name="YUE, Ka Leung" userId="541129f1-78f9-4b79-9dd5-c893242432f5" providerId="ADAL" clId="{854AE85A-E9C8-4BEA-88D8-4A6ACEAD765F}" dt="2024-11-12T09:25:21.202" v="595" actId="9405"/>
-          <ac:inkMkLst>
-            <pc:docMk/>
-            <pc:sldMk cId="3102949145" sldId="258"/>
-            <ac:inkMk id="8" creationId="{ECBC7614-5E57-3D33-7B74-753078D9AA86}"/>
-          </ac:inkMkLst>
-        </pc:inkChg>
-      </pc:sldChg>
-      <pc:sldChg chg="addSp delSp modSp mod">
-        <pc:chgData name="YUE, Ka Leung" userId="541129f1-78f9-4b79-9dd5-c893242432f5" providerId="ADAL" clId="{854AE85A-E9C8-4BEA-88D8-4A6ACEAD765F}" dt="2024-11-12T10:14:22.226" v="974" actId="478"/>
-        <pc:sldMkLst>
-          <pc:docMk/>
-          <pc:sldMk cId="3061954038" sldId="259"/>
-        </pc:sldMkLst>
-        <pc:spChg chg="mod">
-          <ac:chgData name="YUE, Ka Leung" userId="541129f1-78f9-4b79-9dd5-c893242432f5" providerId="ADAL" clId="{854AE85A-E9C8-4BEA-88D8-4A6ACEAD765F}" dt="2024-11-12T08:46:32.619" v="100" actId="20577"/>
-          <ac:spMkLst>
-            <pc:docMk/>
-            <pc:sldMk cId="3061954038" sldId="259"/>
-            <ac:spMk id="2" creationId="{9AC3CE54-9EE7-0EB8-084A-37D13930B715}"/>
-          </ac:spMkLst>
-        </pc:spChg>
-        <pc:spChg chg="mod">
-          <ac:chgData name="YUE, Ka Leung" userId="541129f1-78f9-4b79-9dd5-c893242432f5" providerId="ADAL" clId="{854AE85A-E9C8-4BEA-88D8-4A6ACEAD765F}" dt="2024-11-12T09:51:34.817" v="971" actId="14100"/>
-          <ac:spMkLst>
-            <pc:docMk/>
-            <pc:sldMk cId="3061954038" sldId="259"/>
-            <ac:spMk id="3" creationId="{51D9DE7A-0F75-77AD-0B59-F445955C7F8B}"/>
-          </ac:spMkLst>
-        </pc:spChg>
-        <pc:picChg chg="add del">
-          <ac:chgData name="YUE, Ka Leung" userId="541129f1-78f9-4b79-9dd5-c893242432f5" providerId="ADAL" clId="{854AE85A-E9C8-4BEA-88D8-4A6ACEAD765F}" dt="2024-11-12T09:34:01.894" v="731" actId="22"/>
-          <ac:picMkLst>
-            <pc:docMk/>
-            <pc:sldMk cId="3061954038" sldId="259"/>
-            <ac:picMk id="5" creationId="{73B37E4E-3675-66CA-12F0-E5B87FAB8543}"/>
-          </ac:picMkLst>
-        </pc:picChg>
-        <pc:picChg chg="add del mod">
-          <ac:chgData name="YUE, Ka Leung" userId="541129f1-78f9-4b79-9dd5-c893242432f5" providerId="ADAL" clId="{854AE85A-E9C8-4BEA-88D8-4A6ACEAD765F}" dt="2024-11-12T10:14:22.226" v="974" actId="478"/>
-          <ac:picMkLst>
-            <pc:docMk/>
-            <pc:sldMk cId="3061954038" sldId="259"/>
-            <ac:picMk id="7" creationId="{51FD09E3-57E8-B07D-0CC7-C7F79CEC166E}"/>
-          </ac:picMkLst>
-        </pc:picChg>
-      </pc:sldChg>
-    </pc:docChg>
-  </pc:docChgLst>
   <pc:docChgLst>
     <pc:chgData name="YUE, Ka Leung" userId="541129f1-78f9-4b79-9dd5-c893242432f5" providerId="ADAL" clId="{F864161F-344C-40A2-8DAB-89930D8BF581}"/>
     <pc:docChg chg="undo redo custSel modSld">
@@ -388,6 +222,172 @@
       </pc:sldChg>
     </pc:docChg>
   </pc:docChgLst>
+  <pc:docChgLst>
+    <pc:chgData name="YUE, Ka Leung" userId="541129f1-78f9-4b79-9dd5-c893242432f5" providerId="ADAL" clId="{854AE85A-E9C8-4BEA-88D8-4A6ACEAD765F}"/>
+    <pc:docChg chg="undo redo custSel modSld">
+      <pc:chgData name="YUE, Ka Leung" userId="541129f1-78f9-4b79-9dd5-c893242432f5" providerId="ADAL" clId="{854AE85A-E9C8-4BEA-88D8-4A6ACEAD765F}" dt="2024-11-18T03:29:05.790" v="1458" actId="20577"/>
+      <pc:docMkLst>
+        <pc:docMk/>
+      </pc:docMkLst>
+      <pc:sldChg chg="modSp mod">
+        <pc:chgData name="YUE, Ka Leung" userId="541129f1-78f9-4b79-9dd5-c893242432f5" providerId="ADAL" clId="{854AE85A-E9C8-4BEA-88D8-4A6ACEAD765F}" dt="2024-11-12T09:07:17.633" v="540" actId="20577"/>
+        <pc:sldMkLst>
+          <pc:docMk/>
+          <pc:sldMk cId="2374378964" sldId="257"/>
+        </pc:sldMkLst>
+        <pc:spChg chg="mod">
+          <ac:chgData name="YUE, Ka Leung" userId="541129f1-78f9-4b79-9dd5-c893242432f5" providerId="ADAL" clId="{854AE85A-E9C8-4BEA-88D8-4A6ACEAD765F}" dt="2024-11-12T09:07:17.633" v="540" actId="20577"/>
+          <ac:spMkLst>
+            <pc:docMk/>
+            <pc:sldMk cId="2374378964" sldId="257"/>
+            <ac:spMk id="3" creationId="{58834CCC-396A-83AB-0CEC-E12C15CC31A6}"/>
+          </ac:spMkLst>
+        </pc:spChg>
+        <pc:picChg chg="mod">
+          <ac:chgData name="YUE, Ka Leung" userId="541129f1-78f9-4b79-9dd5-c893242432f5" providerId="ADAL" clId="{854AE85A-E9C8-4BEA-88D8-4A6ACEAD765F}" dt="2024-11-12T08:59:34.340" v="200" actId="1036"/>
+          <ac:picMkLst>
+            <pc:docMk/>
+            <pc:sldMk cId="2374378964" sldId="257"/>
+            <ac:picMk id="2050" creationId="{3353F6F6-2512-3873-893B-1EF077E1A709}"/>
+          </ac:picMkLst>
+        </pc:picChg>
+      </pc:sldChg>
+      <pc:sldChg chg="addSp delSp modSp mod">
+        <pc:chgData name="YUE, Ka Leung" userId="541129f1-78f9-4b79-9dd5-c893242432f5" providerId="ADAL" clId="{854AE85A-E9C8-4BEA-88D8-4A6ACEAD765F}" dt="2024-11-18T03:29:05.790" v="1458" actId="20577"/>
+        <pc:sldMkLst>
+          <pc:docMk/>
+          <pc:sldMk cId="3102949145" sldId="258"/>
+        </pc:sldMkLst>
+        <pc:spChg chg="mod">
+          <ac:chgData name="YUE, Ka Leung" userId="541129f1-78f9-4b79-9dd5-c893242432f5" providerId="ADAL" clId="{854AE85A-E9C8-4BEA-88D8-4A6ACEAD765F}" dt="2024-11-18T03:29:05.790" v="1458" actId="20577"/>
+          <ac:spMkLst>
+            <pc:docMk/>
+            <pc:sldMk cId="3102949145" sldId="258"/>
+            <ac:spMk id="3" creationId="{87FE9185-727A-05EB-9BBB-ABA356B4242B}"/>
+          </ac:spMkLst>
+        </pc:spChg>
+        <pc:picChg chg="add del mod">
+          <ac:chgData name="YUE, Ka Leung" userId="541129f1-78f9-4b79-9dd5-c893242432f5" providerId="ADAL" clId="{854AE85A-E9C8-4BEA-88D8-4A6ACEAD765F}" dt="2024-11-05T04:01:06.861" v="22" actId="478"/>
+          <ac:picMkLst>
+            <pc:docMk/>
+            <pc:sldMk cId="3102949145" sldId="258"/>
+            <ac:picMk id="5" creationId="{E926B2CB-B774-BEF4-7593-C3F87DD9E52D}"/>
+          </ac:picMkLst>
+        </pc:picChg>
+        <pc:picChg chg="add mod">
+          <ac:chgData name="YUE, Ka Leung" userId="541129f1-78f9-4b79-9dd5-c893242432f5" providerId="ADAL" clId="{854AE85A-E9C8-4BEA-88D8-4A6ACEAD765F}" dt="2024-11-12T09:29:47.493" v="681" actId="1038"/>
+          <ac:picMkLst>
+            <pc:docMk/>
+            <pc:sldMk cId="3102949145" sldId="258"/>
+            <ac:picMk id="7" creationId="{DA3E1BF7-DD86-E526-F8F0-271825B462BD}"/>
+          </ac:picMkLst>
+        </pc:picChg>
+        <pc:picChg chg="mod">
+          <ac:chgData name="YUE, Ka Leung" userId="541129f1-78f9-4b79-9dd5-c893242432f5" providerId="ADAL" clId="{854AE85A-E9C8-4BEA-88D8-4A6ACEAD765F}" dt="2024-11-18T03:18:29.891" v="1446" actId="1035"/>
+          <ac:picMkLst>
+            <pc:docMk/>
+            <pc:sldMk cId="3102949145" sldId="258"/>
+            <ac:picMk id="9" creationId="{0C6BC097-7C06-3229-05E1-AA7C21CDD1B9}"/>
+          </ac:picMkLst>
+        </pc:picChg>
+        <pc:picChg chg="del">
+          <ac:chgData name="YUE, Ka Leung" userId="541129f1-78f9-4b79-9dd5-c893242432f5" providerId="ADAL" clId="{854AE85A-E9C8-4BEA-88D8-4A6ACEAD765F}" dt="2024-11-05T03:59:31.213" v="0" actId="478"/>
+          <ac:picMkLst>
+            <pc:docMk/>
+            <pc:sldMk cId="3102949145" sldId="258"/>
+            <ac:picMk id="11" creationId="{E2F116AD-3C1A-6948-CB55-33C36433F3B8}"/>
+          </ac:picMkLst>
+        </pc:picChg>
+        <pc:picChg chg="add mod">
+          <ac:chgData name="YUE, Ka Leung" userId="541129f1-78f9-4b79-9dd5-c893242432f5" providerId="ADAL" clId="{854AE85A-E9C8-4BEA-88D8-4A6ACEAD765F}" dt="2024-11-12T09:29:45.669" v="680" actId="1035"/>
+          <ac:picMkLst>
+            <pc:docMk/>
+            <pc:sldMk cId="3102949145" sldId="258"/>
+            <ac:picMk id="1026" creationId="{6DF05A8F-9484-7131-4E78-BADB49DBEA41}"/>
+          </ac:picMkLst>
+        </pc:picChg>
+        <pc:picChg chg="mod">
+          <ac:chgData name="YUE, Ka Leung" userId="541129f1-78f9-4b79-9dd5-c893242432f5" providerId="ADAL" clId="{854AE85A-E9C8-4BEA-88D8-4A6ACEAD765F}" dt="2024-11-12T09:24:24.833" v="588" actId="1076"/>
+          <ac:picMkLst>
+            <pc:docMk/>
+            <pc:sldMk cId="3102949145" sldId="258"/>
+            <ac:picMk id="3076" creationId="{1D3F9191-A720-49F1-CC0A-B9C1DC7F8AB6}"/>
+          </ac:picMkLst>
+        </pc:picChg>
+        <pc:inkChg chg="add del">
+          <ac:chgData name="YUE, Ka Leung" userId="541129f1-78f9-4b79-9dd5-c893242432f5" providerId="ADAL" clId="{854AE85A-E9C8-4BEA-88D8-4A6ACEAD765F}" dt="2024-11-12T09:24:42.402" v="590" actId="9405"/>
+          <ac:inkMkLst>
+            <pc:docMk/>
+            <pc:sldMk cId="3102949145" sldId="258"/>
+            <ac:inkMk id="4" creationId="{614545C8-ABCC-92D8-B16D-443B7FA070CD}"/>
+          </ac:inkMkLst>
+        </pc:inkChg>
+        <pc:inkChg chg="add del">
+          <ac:chgData name="YUE, Ka Leung" userId="541129f1-78f9-4b79-9dd5-c893242432f5" providerId="ADAL" clId="{854AE85A-E9C8-4BEA-88D8-4A6ACEAD765F}" dt="2024-11-12T09:25:09.315" v="592" actId="9405"/>
+          <ac:inkMkLst>
+            <pc:docMk/>
+            <pc:sldMk cId="3102949145" sldId="258"/>
+            <ac:inkMk id="5" creationId="{AA4E15C8-DDA8-633C-0536-AF4CC387B40C}"/>
+          </ac:inkMkLst>
+        </pc:inkChg>
+        <pc:inkChg chg="add del">
+          <ac:chgData name="YUE, Ka Leung" userId="541129f1-78f9-4b79-9dd5-c893242432f5" providerId="ADAL" clId="{854AE85A-E9C8-4BEA-88D8-4A6ACEAD765F}" dt="2024-11-12T09:25:16.859" v="594" actId="9405"/>
+          <ac:inkMkLst>
+            <pc:docMk/>
+            <pc:sldMk cId="3102949145" sldId="258"/>
+            <ac:inkMk id="6" creationId="{5A5953B6-B3D0-BEAB-4B95-ECEA25B822A3}"/>
+          </ac:inkMkLst>
+        </pc:inkChg>
+        <pc:inkChg chg="add">
+          <ac:chgData name="YUE, Ka Leung" userId="541129f1-78f9-4b79-9dd5-c893242432f5" providerId="ADAL" clId="{854AE85A-E9C8-4BEA-88D8-4A6ACEAD765F}" dt="2024-11-12T09:25:21.202" v="595" actId="9405"/>
+          <ac:inkMkLst>
+            <pc:docMk/>
+            <pc:sldMk cId="3102949145" sldId="258"/>
+            <ac:inkMk id="8" creationId="{ECBC7614-5E57-3D33-7B74-753078D9AA86}"/>
+          </ac:inkMkLst>
+        </pc:inkChg>
+      </pc:sldChg>
+      <pc:sldChg chg="addSp delSp modSp mod">
+        <pc:chgData name="YUE, Ka Leung" userId="541129f1-78f9-4b79-9dd5-c893242432f5" providerId="ADAL" clId="{854AE85A-E9C8-4BEA-88D8-4A6ACEAD765F}" dt="2024-11-18T03:20:52.682" v="1453" actId="20577"/>
+        <pc:sldMkLst>
+          <pc:docMk/>
+          <pc:sldMk cId="3061954038" sldId="259"/>
+        </pc:sldMkLst>
+        <pc:spChg chg="mod">
+          <ac:chgData name="YUE, Ka Leung" userId="541129f1-78f9-4b79-9dd5-c893242432f5" providerId="ADAL" clId="{854AE85A-E9C8-4BEA-88D8-4A6ACEAD765F}" dt="2024-11-12T08:46:32.619" v="100" actId="20577"/>
+          <ac:spMkLst>
+            <pc:docMk/>
+            <pc:sldMk cId="3061954038" sldId="259"/>
+            <ac:spMk id="2" creationId="{9AC3CE54-9EE7-0EB8-084A-37D13930B715}"/>
+          </ac:spMkLst>
+        </pc:spChg>
+        <pc:spChg chg="mod">
+          <ac:chgData name="YUE, Ka Leung" userId="541129f1-78f9-4b79-9dd5-c893242432f5" providerId="ADAL" clId="{854AE85A-E9C8-4BEA-88D8-4A6ACEAD765F}" dt="2024-11-18T03:20:52.682" v="1453" actId="20577"/>
+          <ac:spMkLst>
+            <pc:docMk/>
+            <pc:sldMk cId="3061954038" sldId="259"/>
+            <ac:spMk id="3" creationId="{51D9DE7A-0F75-77AD-0B59-F445955C7F8B}"/>
+          </ac:spMkLst>
+        </pc:spChg>
+        <pc:picChg chg="add del">
+          <ac:chgData name="YUE, Ka Leung" userId="541129f1-78f9-4b79-9dd5-c893242432f5" providerId="ADAL" clId="{854AE85A-E9C8-4BEA-88D8-4A6ACEAD765F}" dt="2024-11-12T09:34:01.894" v="731" actId="22"/>
+          <ac:picMkLst>
+            <pc:docMk/>
+            <pc:sldMk cId="3061954038" sldId="259"/>
+            <ac:picMk id="5" creationId="{73B37E4E-3675-66CA-12F0-E5B87FAB8543}"/>
+          </ac:picMkLst>
+        </pc:picChg>
+        <pc:picChg chg="add del mod">
+          <ac:chgData name="YUE, Ka Leung" userId="541129f1-78f9-4b79-9dd5-c893242432f5" providerId="ADAL" clId="{854AE85A-E9C8-4BEA-88D8-4A6ACEAD765F}" dt="2024-11-12T10:14:22.226" v="974" actId="478"/>
+          <ac:picMkLst>
+            <pc:docMk/>
+            <pc:sldMk cId="3061954038" sldId="259"/>
+            <ac:picMk id="7" creationId="{51FD09E3-57E8-B07D-0CC7-C7F79CEC166E}"/>
+          </ac:picMkLst>
+        </pc:picChg>
+      </pc:sldChg>
+    </pc:docChg>
+  </pc:docChgLst>
 </pc:chgInfo>
 </file>
 
@@ -502,7 +502,7 @@
           <a:p>
             <a:fld id="{A27C1D88-EBBB-43A8-B253-9AED204A1F7E}" type="datetimeFigureOut">
               <a:rPr lang="zh-HK" altLang="en-US" smtClean="0"/>
-              <a:t>16/11/2024</a:t>
+              <a:t>18/11/2024</a:t>
             </a:fld>
             <a:endParaRPr lang="zh-HK" altLang="en-US"/>
           </a:p>
@@ -1039,7 +1039,7 @@
           <a:p>
             <a:fld id="{CACF5AB0-79F4-49E7-8FAC-9523C7F791E9}" type="datetimeFigureOut">
               <a:rPr lang="zh-HK" altLang="en-US" smtClean="0"/>
-              <a:t>16/11/2024</a:t>
+              <a:t>18/11/2024</a:t>
             </a:fld>
             <a:endParaRPr lang="zh-HK" altLang="en-US"/>
           </a:p>
@@ -1337,7 +1337,7 @@
           <a:p>
             <a:fld id="{CACF5AB0-79F4-49E7-8FAC-9523C7F791E9}" type="datetimeFigureOut">
               <a:rPr lang="zh-HK" altLang="en-US" smtClean="0"/>
-              <a:t>16/11/2024</a:t>
+              <a:t>18/11/2024</a:t>
             </a:fld>
             <a:endParaRPr lang="zh-HK" altLang="en-US"/>
           </a:p>
@@ -1529,7 +1529,7 @@
           <a:p>
             <a:fld id="{CACF5AB0-79F4-49E7-8FAC-9523C7F791E9}" type="datetimeFigureOut">
               <a:rPr lang="zh-HK" altLang="en-US" smtClean="0"/>
-              <a:t>16/11/2024</a:t>
+              <a:t>18/11/2024</a:t>
             </a:fld>
             <a:endParaRPr lang="zh-HK" altLang="en-US"/>
           </a:p>
@@ -1790,7 +1790,7 @@
           <a:p>
             <a:fld id="{CACF5AB0-79F4-49E7-8FAC-9523C7F791E9}" type="datetimeFigureOut">
               <a:rPr lang="zh-HK" altLang="en-US" smtClean="0"/>
-              <a:t>16/11/2024</a:t>
+              <a:t>18/11/2024</a:t>
             </a:fld>
             <a:endParaRPr lang="zh-HK" altLang="en-US"/>
           </a:p>
@@ -2214,7 +2214,7 @@
           <a:p>
             <a:fld id="{CACF5AB0-79F4-49E7-8FAC-9523C7F791E9}" type="datetimeFigureOut">
               <a:rPr lang="zh-HK" altLang="en-US" smtClean="0"/>
-              <a:t>16/11/2024</a:t>
+              <a:t>18/11/2024</a:t>
             </a:fld>
             <a:endParaRPr lang="zh-HK" altLang="en-US"/>
           </a:p>
@@ -2751,7 +2751,7 @@
           <a:p>
             <a:fld id="{CACF5AB0-79F4-49E7-8FAC-9523C7F791E9}" type="datetimeFigureOut">
               <a:rPr lang="zh-HK" altLang="en-US" smtClean="0"/>
-              <a:t>16/11/2024</a:t>
+              <a:t>18/11/2024</a:t>
             </a:fld>
             <a:endParaRPr lang="zh-HK" altLang="en-US"/>
           </a:p>
@@ -3615,7 +3615,7 @@
           <a:p>
             <a:fld id="{CACF5AB0-79F4-49E7-8FAC-9523C7F791E9}" type="datetimeFigureOut">
               <a:rPr lang="zh-HK" altLang="en-US" smtClean="0"/>
-              <a:t>16/11/2024</a:t>
+              <a:t>18/11/2024</a:t>
             </a:fld>
             <a:endParaRPr lang="zh-HK" altLang="en-US"/>
           </a:p>
@@ -3785,7 +3785,7 @@
           <a:p>
             <a:fld id="{CACF5AB0-79F4-49E7-8FAC-9523C7F791E9}" type="datetimeFigureOut">
               <a:rPr lang="zh-HK" altLang="en-US" smtClean="0"/>
-              <a:t>16/11/2024</a:t>
+              <a:t>18/11/2024</a:t>
             </a:fld>
             <a:endParaRPr lang="zh-HK" altLang="en-US"/>
           </a:p>
@@ -3969,7 +3969,7 @@
           <a:p>
             <a:fld id="{CACF5AB0-79F4-49E7-8FAC-9523C7F791E9}" type="datetimeFigureOut">
               <a:rPr lang="zh-HK" altLang="en-US" smtClean="0"/>
-              <a:t>16/11/2024</a:t>
+              <a:t>18/11/2024</a:t>
             </a:fld>
             <a:endParaRPr lang="zh-HK" altLang="en-US"/>
           </a:p>
@@ -4139,7 +4139,7 @@
           <a:p>
             <a:fld id="{CACF5AB0-79F4-49E7-8FAC-9523C7F791E9}" type="datetimeFigureOut">
               <a:rPr lang="zh-HK" altLang="en-US" smtClean="0"/>
-              <a:t>16/11/2024</a:t>
+              <a:t>18/11/2024</a:t>
             </a:fld>
             <a:endParaRPr lang="zh-HK" altLang="en-US"/>
           </a:p>
@@ -4383,7 +4383,7 @@
           <a:p>
             <a:fld id="{CACF5AB0-79F4-49E7-8FAC-9523C7F791E9}" type="datetimeFigureOut">
               <a:rPr lang="zh-HK" altLang="en-US" smtClean="0"/>
-              <a:t>16/11/2024</a:t>
+              <a:t>18/11/2024</a:t>
             </a:fld>
             <a:endParaRPr lang="zh-HK" altLang="en-US"/>
           </a:p>
@@ -4619,7 +4619,7 @@
           <a:p>
             <a:fld id="{CACF5AB0-79F4-49E7-8FAC-9523C7F791E9}" type="datetimeFigureOut">
               <a:rPr lang="zh-HK" altLang="en-US" smtClean="0"/>
-              <a:t>16/11/2024</a:t>
+              <a:t>18/11/2024</a:t>
             </a:fld>
             <a:endParaRPr lang="zh-HK" altLang="en-US"/>
           </a:p>
@@ -5085,7 +5085,7 @@
           <a:p>
             <a:fld id="{CACF5AB0-79F4-49E7-8FAC-9523C7F791E9}" type="datetimeFigureOut">
               <a:rPr lang="zh-HK" altLang="en-US" smtClean="0"/>
-              <a:t>16/11/2024</a:t>
+              <a:t>18/11/2024</a:t>
             </a:fld>
             <a:endParaRPr lang="zh-HK" altLang="en-US"/>
           </a:p>
@@ -5203,7 +5203,7 @@
           <a:p>
             <a:fld id="{CACF5AB0-79F4-49E7-8FAC-9523C7F791E9}" type="datetimeFigureOut">
               <a:rPr lang="zh-HK" altLang="en-US" smtClean="0"/>
-              <a:t>16/11/2024</a:t>
+              <a:t>18/11/2024</a:t>
             </a:fld>
             <a:endParaRPr lang="zh-HK" altLang="en-US"/>
           </a:p>
@@ -5298,7 +5298,7 @@
           <a:p>
             <a:fld id="{CACF5AB0-79F4-49E7-8FAC-9523C7F791E9}" type="datetimeFigureOut">
               <a:rPr lang="zh-HK" altLang="en-US" smtClean="0"/>
-              <a:t>16/11/2024</a:t>
+              <a:t>18/11/2024</a:t>
             </a:fld>
             <a:endParaRPr lang="zh-HK" altLang="en-US"/>
           </a:p>
@@ -5553,7 +5553,7 @@
           <a:p>
             <a:fld id="{CACF5AB0-79F4-49E7-8FAC-9523C7F791E9}" type="datetimeFigureOut">
               <a:rPr lang="zh-HK" altLang="en-US" smtClean="0"/>
-              <a:t>16/11/2024</a:t>
+              <a:t>18/11/2024</a:t>
             </a:fld>
             <a:endParaRPr lang="zh-HK" altLang="en-US"/>
           </a:p>
@@ -5853,7 +5853,7 @@
           <a:p>
             <a:fld id="{CACF5AB0-79F4-49E7-8FAC-9523C7F791E9}" type="datetimeFigureOut">
               <a:rPr lang="zh-HK" altLang="en-US" smtClean="0"/>
-              <a:t>16/11/2024</a:t>
+              <a:t>18/11/2024</a:t>
             </a:fld>
             <a:endParaRPr lang="zh-HK" altLang="en-US"/>
           </a:p>
@@ -6087,7 +6087,7 @@
           <a:p>
             <a:fld id="{CACF5AB0-79F4-49E7-8FAC-9523C7F791E9}" type="datetimeFigureOut">
               <a:rPr lang="zh-HK" altLang="en-US" smtClean="0"/>
-              <a:t>16/11/2024</a:t>
+              <a:t>18/11/2024</a:t>
             </a:fld>
             <a:endParaRPr lang="zh-HK" altLang="en-US"/>
           </a:p>
@@ -7450,7 +7450,7 @@
                   <a:defRPr/>
                 </a:pPr>
                 <a:r>
-                  <a:rPr kumimoji="0" lang="en-US" altLang="zh-HK" sz="2100" b="0" i="0" u="none" strike="noStrike" kern="1200" cap="none" spc="0" normalizeH="0" baseline="0" noProof="0" dirty="0">
+                  <a:rPr lang="en-US" altLang="zh-HK" sz="2100" dirty="0">
                     <a:ln>
                       <a:solidFill>
                         <a:prstClr val="black">
@@ -7470,15 +7470,39 @@
                         </a:prstClr>
                       </a:outerShdw>
                     </a:effectLst>
-                    <a:uLnTx/>
-                    <a:uFillTx/>
                     <a:latin typeface="Calisto MT" panose="02040603050505030304"/>
                     <a:ea typeface="微軟正黑體" panose="020B0604030504040204" pitchFamily="34" charset="-120"/>
-                    <a:cs typeface="+mn-cs"/>
                     <a:sym typeface="Wingdings" panose="05000000000000000000" pitchFamily="2" charset="2"/>
                   </a:rPr>
-                  <a:t>Skip-gram algorithm: </a:t>
+                  <a:t>Let’s focus on Skip-gram.</a:t>
                 </a:r>
+                <a:endParaRPr kumimoji="0" lang="en-US" altLang="zh-HK" sz="2100" b="0" i="0" u="none" strike="noStrike" kern="1200" cap="none" spc="0" normalizeH="0" baseline="0" noProof="0" dirty="0">
+                  <a:ln>
+                    <a:solidFill>
+                      <a:prstClr val="black">
+                        <a:lumMod val="75000"/>
+                        <a:lumOff val="25000"/>
+                        <a:alpha val="10000"/>
+                      </a:prstClr>
+                    </a:solidFill>
+                  </a:ln>
+                  <a:solidFill>
+                    <a:srgbClr val="DADADA"/>
+                  </a:solidFill>
+                  <a:effectLst>
+                    <a:outerShdw blurRad="9525" dist="25400" dir="14640000" algn="tl" rotWithShape="0">
+                      <a:prstClr val="black">
+                        <a:alpha val="30000"/>
+                      </a:prstClr>
+                    </a:outerShdw>
+                  </a:effectLst>
+                  <a:uLnTx/>
+                  <a:uFillTx/>
+                  <a:latin typeface="Calisto MT" panose="02040603050505030304"/>
+                  <a:ea typeface="微軟正黑體" panose="020B0604030504040204" pitchFamily="34" charset="-120"/>
+                  <a:cs typeface="+mn-cs"/>
+                  <a:sym typeface="Wingdings" panose="05000000000000000000" pitchFamily="2" charset="2"/>
+                </a:endParaRPr>
               </a:p>
               <a:p>
                 <a:pPr marL="342900" marR="0" lvl="0" indent="-306000" algn="l" defTabSz="457200" rtl="0" eaLnBrk="1" fontAlgn="auto" latinLnBrk="0" hangingPunct="1">
@@ -7522,8 +7546,21 @@
                       <a:schemeClr val="tx1"/>
                     </a:solidFill>
                   </a:rPr>
-                  <a:t> in the training of models</a:t>
+                  <a:t> in the training </a:t>
                 </a:r>
+                <a:r>
+                  <a:rPr lang="en-US" altLang="zh-HK">
+                    <a:solidFill>
+                      <a:schemeClr val="tx1"/>
+                    </a:solidFill>
+                  </a:rPr>
+                  <a:t>of models:</a:t>
+                </a:r>
+                <a:endParaRPr lang="en-US" altLang="zh-HK" dirty="0">
+                  <a:solidFill>
+                    <a:schemeClr val="tx1"/>
+                  </a:solidFill>
+                </a:endParaRPr>
               </a:p>
               <a:p>
                 <a:pPr lvl="1"/>
@@ -7984,6 +8021,16 @@
                         </m:nary>
                       </m:den>
                     </m:f>
+                    <m:r>
+                      <a:rPr lang="en-HK" altLang="zh-HK" sz="2200" b="0" i="1" dirty="0" smtClean="0">
+                        <a:solidFill>
+                          <a:schemeClr val="tx1"/>
+                        </a:solidFill>
+                        <a:latin typeface="Cambria Math" panose="02040503050406030204" pitchFamily="18" charset="0"/>
+                        <a:ea typeface="Cambria Math" panose="02040503050406030204" pitchFamily="18" charset="0"/>
+                      </a:rPr>
+                      <m:t>∈[0, 1]</m:t>
+                    </m:r>
                   </m:oMath>
                 </a14:m>
                 <a:endParaRPr lang="en-US" altLang="zh-HK" b="0" dirty="0">
@@ -8000,7 +8047,7 @@
                       <a:schemeClr val="tx1"/>
                     </a:solidFill>
                   </a:rPr>
-                  <a:t>Do you recognize the model being trained from the </a:t>
+                  <a:t>The </a:t>
                 </a:r>
                 <a:r>
                   <a:rPr lang="en-US" altLang="zh-HK" dirty="0" err="1">
@@ -8024,7 +8071,7 @@
                       <a:schemeClr val="tx1"/>
                     </a:solidFill>
                   </a:rPr>
-                  <a:t>?</a:t>
+                  <a:t> gives a probability distribution.</a:t>
                 </a:r>
               </a:p>
               <a:p>
@@ -8078,7 +8125,7 @@
                       <a:schemeClr val="tx1"/>
                     </a:solidFill>
                   </a:rPr>
-                  <a:t> this probability.</a:t>
+                  <a:t> the probability.</a:t>
                 </a:r>
               </a:p>
               <a:p>
@@ -8339,6 +8386,13 @@
                         </m:r>
                       </m:den>
                     </m:f>
+                    <m:r>
+                      <a:rPr lang="en-HK" altLang="zh-HK" b="0" i="1" dirty="0" smtClean="0">
+                        <a:latin typeface="Cambria Math" panose="02040503050406030204" pitchFamily="18" charset="0"/>
+                        <a:ea typeface="Cambria Math" panose="02040503050406030204" pitchFamily="18" charset="0"/>
+                      </a:rPr>
+                      <m:t>∈[−1, 1]</m:t>
+                    </m:r>
                   </m:oMath>
                 </a14:m>
                 <a:endParaRPr lang="en-US" altLang="zh-HK" dirty="0">
@@ -8480,7 +8534,7 @@
               <a:lstStyle/>
               <a:p>
                 <a:r>
-                  <a:rPr lang="en-US">
+                  <a:rPr lang="zh-HK" altLang="en-US">
                     <a:noFill/>
                   </a:rPr>
                   <a:t> </a:t>
@@ -8559,8 +8613,8 @@
         </p:blipFill>
         <p:spPr>
           <a:xfrm>
-            <a:off x="3379781" y="4764669"/>
-            <a:ext cx="486458" cy="454162"/>
+            <a:off x="4748509" y="4817121"/>
+            <a:ext cx="645875" cy="602995"/>
           </a:xfrm>
           <a:prstGeom prst="rect">
             <a:avLst/>
@@ -8644,8 +8698,8 @@
           </a:extLst>
         </p:spPr>
       </p:pic>
-      <mc:AlternateContent xmlns:mc="http://schemas.openxmlformats.org/markup-compatibility/2006">
-        <mc:Choice xmlns:p14="http://schemas.microsoft.com/office/powerpoint/2010/main" Requires="p14">
+      <mc:AlternateContent xmlns:mc="http://schemas.openxmlformats.org/markup-compatibility/2006" xmlns:p14="http://schemas.microsoft.com/office/powerpoint/2010/main">
+        <mc:Choice Requires="p14">
           <p:contentPart p14:bwMode="auto" r:id="rId8">
             <p14:nvContentPartPr>
               <p14:cNvPr id="8" name="Ink 7">
@@ -8664,7 +8718,7 @@
             </p14:xfrm>
           </p:contentPart>
         </mc:Choice>
-        <mc:Fallback>
+        <mc:Fallback xmlns="">
           <p:pic>
             <p:nvPicPr>
               <p:cNvPr id="8" name="Ink 7">
@@ -8863,7 +8917,7 @@
           <a:p>
             <a:r>
               <a:rPr lang="en-US" altLang="zh-HK" dirty="0"/>
-              <a:t>Factors affecting prediction: Size of corpus, preprocessing techniques (stop word removal, tokenization), epochs, sampling etc.</a:t>
+              <a:t>Factors affecting prediction: size of corpus, preprocessing techniques (stop word removal, tokenization), epochs, sampling etc.</a:t>
             </a:r>
           </a:p>
           <a:p>

</xml_diff>

<commit_message>
updated script, pptx, and visualization trials
</commit_message>
<xml_diff>
--- a/Presentation.pptx
+++ b/Presentation.pptx
@@ -121,7 +121,7 @@
 <file path=ppt/revisionInfo.xml><?xml version="1.0" encoding="utf-8"?>
 <p1510:revInfo xmlns:a="http://schemas.openxmlformats.org/drawingml/2006/main" xmlns:r="http://schemas.openxmlformats.org/officeDocument/2006/relationships" xmlns:p1510="http://schemas.microsoft.com/office/powerpoint/2015/10/main">
   <p1510:revLst>
-    <p1510:client id="{854AE85A-E9C8-4BEA-88D8-4A6ACEAD765F}" v="116" dt="2024-11-18T03:18:19.541"/>
+    <p1510:client id="{854AE85A-E9C8-4BEA-88D8-4A6ACEAD765F}" v="143" dt="2024-11-18T20:56:04.293"/>
   </p1510:revLst>
 </p1510:revInfo>
 </file>
@@ -225,7 +225,7 @@
   <pc:docChgLst>
     <pc:chgData name="YUE, Ka Leung" userId="541129f1-78f9-4b79-9dd5-c893242432f5" providerId="ADAL" clId="{854AE85A-E9C8-4BEA-88D8-4A6ACEAD765F}"/>
     <pc:docChg chg="undo redo custSel modSld">
-      <pc:chgData name="YUE, Ka Leung" userId="541129f1-78f9-4b79-9dd5-c893242432f5" providerId="ADAL" clId="{854AE85A-E9C8-4BEA-88D8-4A6ACEAD765F}" dt="2024-11-18T03:29:05.790" v="1458" actId="20577"/>
+      <pc:chgData name="YUE, Ka Leung" userId="541129f1-78f9-4b79-9dd5-c893242432f5" providerId="ADAL" clId="{854AE85A-E9C8-4BEA-88D8-4A6ACEAD765F}" dt="2024-11-18T20:56:04.293" v="1656" actId="14100"/>
       <pc:docMkLst>
         <pc:docMk/>
       </pc:docMkLst>
@@ -253,7 +253,7 @@
         </pc:picChg>
       </pc:sldChg>
       <pc:sldChg chg="addSp delSp modSp mod">
-        <pc:chgData name="YUE, Ka Leung" userId="541129f1-78f9-4b79-9dd5-c893242432f5" providerId="ADAL" clId="{854AE85A-E9C8-4BEA-88D8-4A6ACEAD765F}" dt="2024-11-18T03:29:05.790" v="1458" actId="20577"/>
+        <pc:chgData name="YUE, Ka Leung" userId="541129f1-78f9-4b79-9dd5-c893242432f5" providerId="ADAL" clId="{854AE85A-E9C8-4BEA-88D8-4A6ACEAD765F}" dt="2024-11-18T20:56:04.293" v="1656" actId="14100"/>
         <pc:sldMkLst>
           <pc:docMk/>
           <pc:sldMk cId="3102949145" sldId="258"/>
@@ -266,6 +266,14 @@
             <ac:spMk id="3" creationId="{87FE9185-727A-05EB-9BBB-ABA356B4242B}"/>
           </ac:spMkLst>
         </pc:spChg>
+        <pc:picChg chg="mod">
+          <ac:chgData name="YUE, Ka Leung" userId="541129f1-78f9-4b79-9dd5-c893242432f5" providerId="ADAL" clId="{854AE85A-E9C8-4BEA-88D8-4A6ACEAD765F}" dt="2024-11-18T20:55:56.747" v="1655" actId="14100"/>
+          <ac:picMkLst>
+            <pc:docMk/>
+            <pc:sldMk cId="3102949145" sldId="258"/>
+            <ac:picMk id="5" creationId="{505BE787-8D54-9197-2E40-9298D867DCD3}"/>
+          </ac:picMkLst>
+        </pc:picChg>
         <pc:picChg chg="add del mod">
           <ac:chgData name="YUE, Ka Leung" userId="541129f1-78f9-4b79-9dd5-c893242432f5" providerId="ADAL" clId="{854AE85A-E9C8-4BEA-88D8-4A6ACEAD765F}" dt="2024-11-05T04:01:06.861" v="22" actId="478"/>
           <ac:picMkLst>
@@ -299,7 +307,7 @@
           </ac:picMkLst>
         </pc:picChg>
         <pc:picChg chg="add mod">
-          <ac:chgData name="YUE, Ka Leung" userId="541129f1-78f9-4b79-9dd5-c893242432f5" providerId="ADAL" clId="{854AE85A-E9C8-4BEA-88D8-4A6ACEAD765F}" dt="2024-11-12T09:29:45.669" v="680" actId="1035"/>
+          <ac:chgData name="YUE, Ka Leung" userId="541129f1-78f9-4b79-9dd5-c893242432f5" providerId="ADAL" clId="{854AE85A-E9C8-4BEA-88D8-4A6ACEAD765F}" dt="2024-11-18T20:55:36.560" v="1617" actId="1037"/>
           <ac:picMkLst>
             <pc:docMk/>
             <pc:sldMk cId="3102949145" sldId="258"/>
@@ -307,7 +315,7 @@
           </ac:picMkLst>
         </pc:picChg>
         <pc:picChg chg="mod">
-          <ac:chgData name="YUE, Ka Leung" userId="541129f1-78f9-4b79-9dd5-c893242432f5" providerId="ADAL" clId="{854AE85A-E9C8-4BEA-88D8-4A6ACEAD765F}" dt="2024-11-12T09:24:24.833" v="588" actId="1076"/>
+          <ac:chgData name="YUE, Ka Leung" userId="541129f1-78f9-4b79-9dd5-c893242432f5" providerId="ADAL" clId="{854AE85A-E9C8-4BEA-88D8-4A6ACEAD765F}" dt="2024-11-18T20:56:04.293" v="1656" actId="14100"/>
           <ac:picMkLst>
             <pc:docMk/>
             <pc:sldMk cId="3102949145" sldId="258"/>
@@ -348,7 +356,7 @@
         </pc:inkChg>
       </pc:sldChg>
       <pc:sldChg chg="addSp delSp modSp mod">
-        <pc:chgData name="YUE, Ka Leung" userId="541129f1-78f9-4b79-9dd5-c893242432f5" providerId="ADAL" clId="{854AE85A-E9C8-4BEA-88D8-4A6ACEAD765F}" dt="2024-11-18T03:20:52.682" v="1453" actId="20577"/>
+        <pc:chgData name="YUE, Ka Leung" userId="541129f1-78f9-4b79-9dd5-c893242432f5" providerId="ADAL" clId="{854AE85A-E9C8-4BEA-88D8-4A6ACEAD765F}" dt="2024-11-18T20:32:24.807" v="1598" actId="1037"/>
         <pc:sldMkLst>
           <pc:docMk/>
           <pc:sldMk cId="3061954038" sldId="259"/>
@@ -362,13 +370,21 @@
           </ac:spMkLst>
         </pc:spChg>
         <pc:spChg chg="mod">
-          <ac:chgData name="YUE, Ka Leung" userId="541129f1-78f9-4b79-9dd5-c893242432f5" providerId="ADAL" clId="{854AE85A-E9C8-4BEA-88D8-4A6ACEAD765F}" dt="2024-11-18T03:20:52.682" v="1453" actId="20577"/>
+          <ac:chgData name="YUE, Ka Leung" userId="541129f1-78f9-4b79-9dd5-c893242432f5" providerId="ADAL" clId="{854AE85A-E9C8-4BEA-88D8-4A6ACEAD765F}" dt="2024-11-18T20:31:14.730" v="1547" actId="14100"/>
           <ac:spMkLst>
             <pc:docMk/>
             <pc:sldMk cId="3061954038" sldId="259"/>
             <ac:spMk id="3" creationId="{51D9DE7A-0F75-77AD-0B59-F445955C7F8B}"/>
           </ac:spMkLst>
         </pc:spChg>
+        <pc:picChg chg="mod">
+          <ac:chgData name="YUE, Ka Leung" userId="541129f1-78f9-4b79-9dd5-c893242432f5" providerId="ADAL" clId="{854AE85A-E9C8-4BEA-88D8-4A6ACEAD765F}" dt="2024-11-18T20:31:14.438" v="1545" actId="1035"/>
+          <ac:picMkLst>
+            <pc:docMk/>
+            <pc:sldMk cId="3061954038" sldId="259"/>
+            <ac:picMk id="5" creationId="{37122F9A-6D00-CA88-30D4-7466B106F714}"/>
+          </ac:picMkLst>
+        </pc:picChg>
         <pc:picChg chg="add del">
           <ac:chgData name="YUE, Ka Leung" userId="541129f1-78f9-4b79-9dd5-c893242432f5" providerId="ADAL" clId="{854AE85A-E9C8-4BEA-88D8-4A6ACEAD765F}" dt="2024-11-12T09:34:01.894" v="731" actId="22"/>
           <ac:picMkLst>
@@ -377,12 +393,28 @@
             <ac:picMk id="5" creationId="{73B37E4E-3675-66CA-12F0-E5B87FAB8543}"/>
           </ac:picMkLst>
         </pc:picChg>
+        <pc:picChg chg="add mod">
+          <ac:chgData name="YUE, Ka Leung" userId="541129f1-78f9-4b79-9dd5-c893242432f5" providerId="ADAL" clId="{854AE85A-E9C8-4BEA-88D8-4A6ACEAD765F}" dt="2024-11-18T20:32:24.807" v="1598" actId="1037"/>
+          <ac:picMkLst>
+            <pc:docMk/>
+            <pc:sldMk cId="3061954038" sldId="259"/>
+            <ac:picMk id="6" creationId="{5EF43EE0-72E1-7D66-8DE3-F58B34A27EA8}"/>
+          </ac:picMkLst>
+        </pc:picChg>
         <pc:picChg chg="add del mod">
           <ac:chgData name="YUE, Ka Leung" userId="541129f1-78f9-4b79-9dd5-c893242432f5" providerId="ADAL" clId="{854AE85A-E9C8-4BEA-88D8-4A6ACEAD765F}" dt="2024-11-12T10:14:22.226" v="974" actId="478"/>
           <ac:picMkLst>
             <pc:docMk/>
             <pc:sldMk cId="3061954038" sldId="259"/>
             <ac:picMk id="7" creationId="{51FD09E3-57E8-B07D-0CC7-C7F79CEC166E}"/>
+          </ac:picMkLst>
+        </pc:picChg>
+        <pc:picChg chg="mod">
+          <ac:chgData name="YUE, Ka Leung" userId="541129f1-78f9-4b79-9dd5-c893242432f5" providerId="ADAL" clId="{854AE85A-E9C8-4BEA-88D8-4A6ACEAD765F}" dt="2024-11-18T20:32:24.743" v="1596" actId="1035"/>
+          <ac:picMkLst>
+            <pc:docMk/>
+            <pc:sldMk cId="3061954038" sldId="259"/>
+            <ac:picMk id="7" creationId="{E16CF1A5-48A0-4480-5D04-76A827181513}"/>
           </ac:picMkLst>
         </pc:picChg>
       </pc:sldChg>
@@ -502,7 +534,7 @@
           <a:p>
             <a:fld id="{A27C1D88-EBBB-43A8-B253-9AED204A1F7E}" type="datetimeFigureOut">
               <a:rPr lang="zh-HK" altLang="en-US" smtClean="0"/>
-              <a:t>18/11/2024</a:t>
+              <a:t>19/11/2024</a:t>
             </a:fld>
             <a:endParaRPr lang="zh-HK" altLang="en-US"/>
           </a:p>
@@ -1039,7 +1071,7 @@
           <a:p>
             <a:fld id="{CACF5AB0-79F4-49E7-8FAC-9523C7F791E9}" type="datetimeFigureOut">
               <a:rPr lang="zh-HK" altLang="en-US" smtClean="0"/>
-              <a:t>18/11/2024</a:t>
+              <a:t>19/11/2024</a:t>
             </a:fld>
             <a:endParaRPr lang="zh-HK" altLang="en-US"/>
           </a:p>
@@ -1337,7 +1369,7 @@
           <a:p>
             <a:fld id="{CACF5AB0-79F4-49E7-8FAC-9523C7F791E9}" type="datetimeFigureOut">
               <a:rPr lang="zh-HK" altLang="en-US" smtClean="0"/>
-              <a:t>18/11/2024</a:t>
+              <a:t>19/11/2024</a:t>
             </a:fld>
             <a:endParaRPr lang="zh-HK" altLang="en-US"/>
           </a:p>
@@ -1529,7 +1561,7 @@
           <a:p>
             <a:fld id="{CACF5AB0-79F4-49E7-8FAC-9523C7F791E9}" type="datetimeFigureOut">
               <a:rPr lang="zh-HK" altLang="en-US" smtClean="0"/>
-              <a:t>18/11/2024</a:t>
+              <a:t>19/11/2024</a:t>
             </a:fld>
             <a:endParaRPr lang="zh-HK" altLang="en-US"/>
           </a:p>
@@ -1790,7 +1822,7 @@
           <a:p>
             <a:fld id="{CACF5AB0-79F4-49E7-8FAC-9523C7F791E9}" type="datetimeFigureOut">
               <a:rPr lang="zh-HK" altLang="en-US" smtClean="0"/>
-              <a:t>18/11/2024</a:t>
+              <a:t>19/11/2024</a:t>
             </a:fld>
             <a:endParaRPr lang="zh-HK" altLang="en-US"/>
           </a:p>
@@ -2214,7 +2246,7 @@
           <a:p>
             <a:fld id="{CACF5AB0-79F4-49E7-8FAC-9523C7F791E9}" type="datetimeFigureOut">
               <a:rPr lang="zh-HK" altLang="en-US" smtClean="0"/>
-              <a:t>18/11/2024</a:t>
+              <a:t>19/11/2024</a:t>
             </a:fld>
             <a:endParaRPr lang="zh-HK" altLang="en-US"/>
           </a:p>
@@ -2751,7 +2783,7 @@
           <a:p>
             <a:fld id="{CACF5AB0-79F4-49E7-8FAC-9523C7F791E9}" type="datetimeFigureOut">
               <a:rPr lang="zh-HK" altLang="en-US" smtClean="0"/>
-              <a:t>18/11/2024</a:t>
+              <a:t>19/11/2024</a:t>
             </a:fld>
             <a:endParaRPr lang="zh-HK" altLang="en-US"/>
           </a:p>
@@ -3615,7 +3647,7 @@
           <a:p>
             <a:fld id="{CACF5AB0-79F4-49E7-8FAC-9523C7F791E9}" type="datetimeFigureOut">
               <a:rPr lang="zh-HK" altLang="en-US" smtClean="0"/>
-              <a:t>18/11/2024</a:t>
+              <a:t>19/11/2024</a:t>
             </a:fld>
             <a:endParaRPr lang="zh-HK" altLang="en-US"/>
           </a:p>
@@ -3785,7 +3817,7 @@
           <a:p>
             <a:fld id="{CACF5AB0-79F4-49E7-8FAC-9523C7F791E9}" type="datetimeFigureOut">
               <a:rPr lang="zh-HK" altLang="en-US" smtClean="0"/>
-              <a:t>18/11/2024</a:t>
+              <a:t>19/11/2024</a:t>
             </a:fld>
             <a:endParaRPr lang="zh-HK" altLang="en-US"/>
           </a:p>
@@ -3969,7 +4001,7 @@
           <a:p>
             <a:fld id="{CACF5AB0-79F4-49E7-8FAC-9523C7F791E9}" type="datetimeFigureOut">
               <a:rPr lang="zh-HK" altLang="en-US" smtClean="0"/>
-              <a:t>18/11/2024</a:t>
+              <a:t>19/11/2024</a:t>
             </a:fld>
             <a:endParaRPr lang="zh-HK" altLang="en-US"/>
           </a:p>
@@ -4139,7 +4171,7 @@
           <a:p>
             <a:fld id="{CACF5AB0-79F4-49E7-8FAC-9523C7F791E9}" type="datetimeFigureOut">
               <a:rPr lang="zh-HK" altLang="en-US" smtClean="0"/>
-              <a:t>18/11/2024</a:t>
+              <a:t>19/11/2024</a:t>
             </a:fld>
             <a:endParaRPr lang="zh-HK" altLang="en-US"/>
           </a:p>
@@ -4383,7 +4415,7 @@
           <a:p>
             <a:fld id="{CACF5AB0-79F4-49E7-8FAC-9523C7F791E9}" type="datetimeFigureOut">
               <a:rPr lang="zh-HK" altLang="en-US" smtClean="0"/>
-              <a:t>18/11/2024</a:t>
+              <a:t>19/11/2024</a:t>
             </a:fld>
             <a:endParaRPr lang="zh-HK" altLang="en-US"/>
           </a:p>
@@ -4619,7 +4651,7 @@
           <a:p>
             <a:fld id="{CACF5AB0-79F4-49E7-8FAC-9523C7F791E9}" type="datetimeFigureOut">
               <a:rPr lang="zh-HK" altLang="en-US" smtClean="0"/>
-              <a:t>18/11/2024</a:t>
+              <a:t>19/11/2024</a:t>
             </a:fld>
             <a:endParaRPr lang="zh-HK" altLang="en-US"/>
           </a:p>
@@ -5085,7 +5117,7 @@
           <a:p>
             <a:fld id="{CACF5AB0-79F4-49E7-8FAC-9523C7F791E9}" type="datetimeFigureOut">
               <a:rPr lang="zh-HK" altLang="en-US" smtClean="0"/>
-              <a:t>18/11/2024</a:t>
+              <a:t>19/11/2024</a:t>
             </a:fld>
             <a:endParaRPr lang="zh-HK" altLang="en-US"/>
           </a:p>
@@ -5203,7 +5235,7 @@
           <a:p>
             <a:fld id="{CACF5AB0-79F4-49E7-8FAC-9523C7F791E9}" type="datetimeFigureOut">
               <a:rPr lang="zh-HK" altLang="en-US" smtClean="0"/>
-              <a:t>18/11/2024</a:t>
+              <a:t>19/11/2024</a:t>
             </a:fld>
             <a:endParaRPr lang="zh-HK" altLang="en-US"/>
           </a:p>
@@ -5298,7 +5330,7 @@
           <a:p>
             <a:fld id="{CACF5AB0-79F4-49E7-8FAC-9523C7F791E9}" type="datetimeFigureOut">
               <a:rPr lang="zh-HK" altLang="en-US" smtClean="0"/>
-              <a:t>18/11/2024</a:t>
+              <a:t>19/11/2024</a:t>
             </a:fld>
             <a:endParaRPr lang="zh-HK" altLang="en-US"/>
           </a:p>
@@ -5553,7 +5585,7 @@
           <a:p>
             <a:fld id="{CACF5AB0-79F4-49E7-8FAC-9523C7F791E9}" type="datetimeFigureOut">
               <a:rPr lang="zh-HK" altLang="en-US" smtClean="0"/>
-              <a:t>18/11/2024</a:t>
+              <a:t>19/11/2024</a:t>
             </a:fld>
             <a:endParaRPr lang="zh-HK" altLang="en-US"/>
           </a:p>
@@ -5853,7 +5885,7 @@
           <a:p>
             <a:fld id="{CACF5AB0-79F4-49E7-8FAC-9523C7F791E9}" type="datetimeFigureOut">
               <a:rPr lang="zh-HK" altLang="en-US" smtClean="0"/>
-              <a:t>18/11/2024</a:t>
+              <a:t>19/11/2024</a:t>
             </a:fld>
             <a:endParaRPr lang="zh-HK" altLang="en-US"/>
           </a:p>
@@ -6087,7 +6119,7 @@
           <a:p>
             <a:fld id="{CACF5AB0-79F4-49E7-8FAC-9523C7F791E9}" type="datetimeFigureOut">
               <a:rPr lang="zh-HK" altLang="en-US" smtClean="0"/>
-              <a:t>18/11/2024</a:t>
+              <a:t>19/11/2024</a:t>
             </a:fld>
             <a:endParaRPr lang="zh-HK" altLang="en-US"/>
           </a:p>
@@ -7329,8 +7361,8 @@
           </a:p>
         </p:txBody>
       </p:sp>
-      <mc:AlternateContent xmlns:mc="http://schemas.openxmlformats.org/markup-compatibility/2006">
-        <mc:Choice xmlns:a14="http://schemas.microsoft.com/office/drawing/2010/main" Requires="a14">
+      <mc:AlternateContent xmlns:mc="http://schemas.openxmlformats.org/markup-compatibility/2006" xmlns:a14="http://schemas.microsoft.com/office/drawing/2010/main">
+        <mc:Choice Requires="a14">
           <p:sp>
             <p:nvSpPr>
               <p:cNvPr id="3" name="內容版面配置區 2">
@@ -8500,7 +8532,7 @@
             </p:txBody>
           </p:sp>
         </mc:Choice>
-        <mc:Fallback>
+        <mc:Fallback xmlns="">
           <p:sp>
             <p:nvSpPr>
               <p:cNvPr id="3" name="內容版面配置區 2">
@@ -8573,8 +8605,8 @@
         </p:blipFill>
         <p:spPr bwMode="auto">
           <a:xfrm>
-            <a:off x="7636695" y="1529531"/>
-            <a:ext cx="3805003" cy="2085799"/>
+            <a:off x="7590687" y="1506234"/>
+            <a:ext cx="3976858" cy="2180005"/>
           </a:xfrm>
           <a:prstGeom prst="rect">
             <a:avLst/>
@@ -8680,8 +8712,8 @@
         </p:blipFill>
         <p:spPr bwMode="auto">
           <a:xfrm>
-            <a:off x="6246036" y="3339674"/>
-            <a:ext cx="788531" cy="788531"/>
+            <a:off x="6154021" y="3062067"/>
+            <a:ext cx="1340934" cy="1340934"/>
           </a:xfrm>
           <a:prstGeom prst="rect">
             <a:avLst/>
@@ -8771,8 +8803,8 @@
         </p:blipFill>
         <p:spPr>
           <a:xfrm>
-            <a:off x="6411240" y="5218831"/>
-            <a:ext cx="5159813" cy="1388199"/>
+            <a:off x="6301972" y="5151107"/>
+            <a:ext cx="5269082" cy="1417597"/>
           </a:xfrm>
           <a:prstGeom prst="rect">
             <a:avLst/>
@@ -9005,8 +9037,38 @@
         </p:blipFill>
         <p:spPr>
           <a:xfrm>
-            <a:off x="8129244" y="3014598"/>
-            <a:ext cx="3360820" cy="2463735"/>
+            <a:off x="7703057" y="2681044"/>
+            <a:ext cx="2257841" cy="1655168"/>
+          </a:xfrm>
+          <a:prstGeom prst="rect">
+            <a:avLst/>
+          </a:prstGeom>
+        </p:spPr>
+      </p:pic>
+      <p:pic>
+        <p:nvPicPr>
+          <p:cNvPr id="6" name="Picture 5">
+            <a:extLst>
+              <a:ext uri="{FF2B5EF4-FFF2-40B4-BE49-F238E27FC236}">
+                <a16:creationId xmlns:a16="http://schemas.microsoft.com/office/drawing/2014/main" id="{5EF43EE0-72E1-7D66-8DE3-F58B34A27EA8}"/>
+              </a:ext>
+            </a:extLst>
+          </p:cNvPr>
+          <p:cNvPicPr>
+            <a:picLocks noChangeAspect="1"/>
+          </p:cNvPicPr>
+          <p:nvPr/>
+        </p:nvPicPr>
+        <p:blipFill>
+          <a:blip r:embed="rId5"/>
+          <a:stretch>
+            <a:fillRect/>
+          </a:stretch>
+        </p:blipFill>
+        <p:spPr>
+          <a:xfrm>
+            <a:off x="8022565" y="4399151"/>
+            <a:ext cx="2888983" cy="2075391"/>
           </a:xfrm>
           <a:prstGeom prst="rect">
             <a:avLst/>

</xml_diff>

<commit_message>
small tweaks in pptx
</commit_message>
<xml_diff>
--- a/Presentation.pptx
+++ b/Presentation.pptx
@@ -225,7 +225,7 @@
   <pc:docChgLst>
     <pc:chgData name="YUE, Ka Leung" userId="541129f1-78f9-4b79-9dd5-c893242432f5" providerId="ADAL" clId="{854AE85A-E9C8-4BEA-88D8-4A6ACEAD765F}"/>
     <pc:docChg chg="undo redo custSel modSld">
-      <pc:chgData name="YUE, Ka Leung" userId="541129f1-78f9-4b79-9dd5-c893242432f5" providerId="ADAL" clId="{854AE85A-E9C8-4BEA-88D8-4A6ACEAD765F}" dt="2024-11-18T20:56:04.293" v="1656" actId="14100"/>
+      <pc:chgData name="YUE, Ka Leung" userId="541129f1-78f9-4b79-9dd5-c893242432f5" providerId="ADAL" clId="{854AE85A-E9C8-4BEA-88D8-4A6ACEAD765F}" dt="2024-11-18T21:10:55.423" v="1752" actId="1038"/>
       <pc:docMkLst>
         <pc:docMk/>
       </pc:docMkLst>
@@ -356,7 +356,7 @@
         </pc:inkChg>
       </pc:sldChg>
       <pc:sldChg chg="addSp delSp modSp mod">
-        <pc:chgData name="YUE, Ka Leung" userId="541129f1-78f9-4b79-9dd5-c893242432f5" providerId="ADAL" clId="{854AE85A-E9C8-4BEA-88D8-4A6ACEAD765F}" dt="2024-11-18T20:32:24.807" v="1598" actId="1037"/>
+        <pc:chgData name="YUE, Ka Leung" userId="541129f1-78f9-4b79-9dd5-c893242432f5" providerId="ADAL" clId="{854AE85A-E9C8-4BEA-88D8-4A6ACEAD765F}" dt="2024-11-18T21:10:55.423" v="1752" actId="1038"/>
         <pc:sldMkLst>
           <pc:docMk/>
           <pc:sldMk cId="3061954038" sldId="259"/>
@@ -394,7 +394,7 @@
           </ac:picMkLst>
         </pc:picChg>
         <pc:picChg chg="add mod">
-          <ac:chgData name="YUE, Ka Leung" userId="541129f1-78f9-4b79-9dd5-c893242432f5" providerId="ADAL" clId="{854AE85A-E9C8-4BEA-88D8-4A6ACEAD765F}" dt="2024-11-18T20:32:24.807" v="1598" actId="1037"/>
+          <ac:chgData name="YUE, Ka Leung" userId="541129f1-78f9-4b79-9dd5-c893242432f5" providerId="ADAL" clId="{854AE85A-E9C8-4BEA-88D8-4A6ACEAD765F}" dt="2024-11-18T21:10:07.314" v="1712" actId="14100"/>
           <ac:picMkLst>
             <pc:docMk/>
             <pc:sldMk cId="3061954038" sldId="259"/>
@@ -410,11 +410,19 @@
           </ac:picMkLst>
         </pc:picChg>
         <pc:picChg chg="mod">
-          <ac:chgData name="YUE, Ka Leung" userId="541129f1-78f9-4b79-9dd5-c893242432f5" providerId="ADAL" clId="{854AE85A-E9C8-4BEA-88D8-4A6ACEAD765F}" dt="2024-11-18T20:32:24.743" v="1596" actId="1035"/>
+          <ac:chgData name="YUE, Ka Leung" userId="541129f1-78f9-4b79-9dd5-c893242432f5" providerId="ADAL" clId="{854AE85A-E9C8-4BEA-88D8-4A6ACEAD765F}" dt="2024-11-18T21:10:55.423" v="1752" actId="1038"/>
           <ac:picMkLst>
             <pc:docMk/>
             <pc:sldMk cId="3061954038" sldId="259"/>
             <ac:picMk id="7" creationId="{E16CF1A5-48A0-4480-5D04-76A827181513}"/>
+          </ac:picMkLst>
+        </pc:picChg>
+        <pc:picChg chg="add mod">
+          <ac:chgData name="YUE, Ka Leung" userId="541129f1-78f9-4b79-9dd5-c893242432f5" providerId="ADAL" clId="{854AE85A-E9C8-4BEA-88D8-4A6ACEAD765F}" dt="2024-11-18T21:10:50.473" v="1749" actId="1076"/>
+          <ac:picMkLst>
+            <pc:docMk/>
+            <pc:sldMk cId="3061954038" sldId="259"/>
+            <ac:picMk id="8" creationId="{68705576-6698-CCCE-4B17-77A0FC6A32D2}"/>
           </ac:picMkLst>
         </pc:picChg>
       </pc:sldChg>
@@ -9037,7 +9045,7 @@
         </p:blipFill>
         <p:spPr>
           <a:xfrm>
-            <a:off x="7703057" y="2681044"/>
+            <a:off x="9888538" y="2681044"/>
             <a:ext cx="2257841" cy="1655168"/>
           </a:xfrm>
           <a:prstGeom prst="rect">
@@ -9067,8 +9075,38 @@
         </p:blipFill>
         <p:spPr>
           <a:xfrm>
-            <a:off x="8022565" y="4399151"/>
-            <a:ext cx="2888983" cy="2075391"/>
+            <a:off x="7892909" y="4399151"/>
+            <a:ext cx="3209545" cy="2305677"/>
+          </a:xfrm>
+          <a:prstGeom prst="rect">
+            <a:avLst/>
+          </a:prstGeom>
+        </p:spPr>
+      </p:pic>
+      <p:pic>
+        <p:nvPicPr>
+          <p:cNvPr id="8" name="Picture 7">
+            <a:extLst>
+              <a:ext uri="{FF2B5EF4-FFF2-40B4-BE49-F238E27FC236}">
+                <a16:creationId xmlns:a16="http://schemas.microsoft.com/office/drawing/2014/main" id="{68705576-6698-CCCE-4B17-77A0FC6A32D2}"/>
+              </a:ext>
+            </a:extLst>
+          </p:cNvPr>
+          <p:cNvPicPr>
+            <a:picLocks noChangeAspect="1"/>
+          </p:cNvPicPr>
+          <p:nvPr/>
+        </p:nvPicPr>
+        <p:blipFill>
+          <a:blip r:embed="rId6"/>
+          <a:stretch>
+            <a:fillRect/>
+          </a:stretch>
+        </p:blipFill>
+        <p:spPr>
+          <a:xfrm>
+            <a:off x="7553646" y="2751169"/>
+            <a:ext cx="2321244" cy="1521742"/>
           </a:xfrm>
           <a:prstGeom prst="rect">
             <a:avLst/>

</xml_diff>

<commit_message>
small tweaks in pptx again and added pdf
</commit_message>
<xml_diff>
--- a/Presentation.pptx
+++ b/Presentation.pptx
@@ -121,7 +121,7 @@
 <file path=ppt/revisionInfo.xml><?xml version="1.0" encoding="utf-8"?>
 <p1510:revInfo xmlns:a="http://schemas.openxmlformats.org/drawingml/2006/main" xmlns:r="http://schemas.openxmlformats.org/officeDocument/2006/relationships" xmlns:p1510="http://schemas.microsoft.com/office/powerpoint/2015/10/main">
   <p1510:revLst>
-    <p1510:client id="{854AE85A-E9C8-4BEA-88D8-4A6ACEAD765F}" v="143" dt="2024-11-18T20:56:04.293"/>
+    <p1510:client id="{854AE85A-E9C8-4BEA-88D8-4A6ACEAD765F}" v="152" dt="2024-11-19T03:25:44.503"/>
   </p1510:revLst>
 </p1510:revInfo>
 </file>
@@ -225,7 +225,7 @@
   <pc:docChgLst>
     <pc:chgData name="YUE, Ka Leung" userId="541129f1-78f9-4b79-9dd5-c893242432f5" providerId="ADAL" clId="{854AE85A-E9C8-4BEA-88D8-4A6ACEAD765F}"/>
     <pc:docChg chg="undo redo custSel modSld">
-      <pc:chgData name="YUE, Ka Leung" userId="541129f1-78f9-4b79-9dd5-c893242432f5" providerId="ADAL" clId="{854AE85A-E9C8-4BEA-88D8-4A6ACEAD765F}" dt="2024-11-18T21:10:55.423" v="1752" actId="1038"/>
+      <pc:chgData name="YUE, Ka Leung" userId="541129f1-78f9-4b79-9dd5-c893242432f5" providerId="ADAL" clId="{854AE85A-E9C8-4BEA-88D8-4A6ACEAD765F}" dt="2024-11-19T03:26:58.159" v="2005" actId="20577"/>
       <pc:docMkLst>
         <pc:docMk/>
       </pc:docMkLst>
@@ -253,7 +253,7 @@
         </pc:picChg>
       </pc:sldChg>
       <pc:sldChg chg="addSp delSp modSp mod">
-        <pc:chgData name="YUE, Ka Leung" userId="541129f1-78f9-4b79-9dd5-c893242432f5" providerId="ADAL" clId="{854AE85A-E9C8-4BEA-88D8-4A6ACEAD765F}" dt="2024-11-18T20:56:04.293" v="1656" actId="14100"/>
+        <pc:chgData name="YUE, Ka Leung" userId="541129f1-78f9-4b79-9dd5-c893242432f5" providerId="ADAL" clId="{854AE85A-E9C8-4BEA-88D8-4A6ACEAD765F}" dt="2024-11-19T03:10:00.991" v="1791" actId="1035"/>
         <pc:sldMkLst>
           <pc:docMk/>
           <pc:sldMk cId="3102949145" sldId="258"/>
@@ -315,7 +315,7 @@
           </ac:picMkLst>
         </pc:picChg>
         <pc:picChg chg="mod">
-          <ac:chgData name="YUE, Ka Leung" userId="541129f1-78f9-4b79-9dd5-c893242432f5" providerId="ADAL" clId="{854AE85A-E9C8-4BEA-88D8-4A6ACEAD765F}" dt="2024-11-18T20:56:04.293" v="1656" actId="14100"/>
+          <ac:chgData name="YUE, Ka Leung" userId="541129f1-78f9-4b79-9dd5-c893242432f5" providerId="ADAL" clId="{854AE85A-E9C8-4BEA-88D8-4A6ACEAD765F}" dt="2024-11-19T03:03:25.383" v="1754" actId="1076"/>
           <ac:picMkLst>
             <pc:docMk/>
             <pc:sldMk cId="3102949145" sldId="258"/>
@@ -346,8 +346,8 @@
             <ac:inkMk id="6" creationId="{5A5953B6-B3D0-BEAB-4B95-ECEA25B822A3}"/>
           </ac:inkMkLst>
         </pc:inkChg>
-        <pc:inkChg chg="add">
-          <ac:chgData name="YUE, Ka Leung" userId="541129f1-78f9-4b79-9dd5-c893242432f5" providerId="ADAL" clId="{854AE85A-E9C8-4BEA-88D8-4A6ACEAD765F}" dt="2024-11-12T09:25:21.202" v="595" actId="9405"/>
+        <pc:inkChg chg="add mod">
+          <ac:chgData name="YUE, Ka Leung" userId="541129f1-78f9-4b79-9dd5-c893242432f5" providerId="ADAL" clId="{854AE85A-E9C8-4BEA-88D8-4A6ACEAD765F}" dt="2024-11-19T03:10:00.991" v="1791" actId="1035"/>
           <ac:inkMkLst>
             <pc:docMk/>
             <pc:sldMk cId="3102949145" sldId="258"/>
@@ -356,7 +356,7 @@
         </pc:inkChg>
       </pc:sldChg>
       <pc:sldChg chg="addSp delSp modSp mod">
-        <pc:chgData name="YUE, Ka Leung" userId="541129f1-78f9-4b79-9dd5-c893242432f5" providerId="ADAL" clId="{854AE85A-E9C8-4BEA-88D8-4A6ACEAD765F}" dt="2024-11-18T21:10:55.423" v="1752" actId="1038"/>
+        <pc:chgData name="YUE, Ka Leung" userId="541129f1-78f9-4b79-9dd5-c893242432f5" providerId="ADAL" clId="{854AE85A-E9C8-4BEA-88D8-4A6ACEAD765F}" dt="2024-11-19T03:26:58.159" v="2005" actId="20577"/>
         <pc:sldMkLst>
           <pc:docMk/>
           <pc:sldMk cId="3061954038" sldId="259"/>
@@ -370,11 +370,19 @@
           </ac:spMkLst>
         </pc:spChg>
         <pc:spChg chg="mod">
-          <ac:chgData name="YUE, Ka Leung" userId="541129f1-78f9-4b79-9dd5-c893242432f5" providerId="ADAL" clId="{854AE85A-E9C8-4BEA-88D8-4A6ACEAD765F}" dt="2024-11-18T20:31:14.730" v="1547" actId="14100"/>
+          <ac:chgData name="YUE, Ka Leung" userId="541129f1-78f9-4b79-9dd5-c893242432f5" providerId="ADAL" clId="{854AE85A-E9C8-4BEA-88D8-4A6ACEAD765F}" dt="2024-11-19T03:26:58.159" v="2005" actId="20577"/>
           <ac:spMkLst>
             <pc:docMk/>
             <pc:sldMk cId="3061954038" sldId="259"/>
             <ac:spMk id="3" creationId="{51D9DE7A-0F75-77AD-0B59-F445955C7F8B}"/>
+          </ac:spMkLst>
+        </pc:spChg>
+        <pc:spChg chg="mod">
+          <ac:chgData name="YUE, Ka Leung" userId="541129f1-78f9-4b79-9dd5-c893242432f5" providerId="ADAL" clId="{854AE85A-E9C8-4BEA-88D8-4A6ACEAD765F}" dt="2024-11-19T03:26:49.596" v="2002" actId="20577"/>
+          <ac:spMkLst>
+            <pc:docMk/>
+            <pc:sldMk cId="3061954038" sldId="259"/>
+            <ac:spMk id="9" creationId="{ADA993E3-54AC-E729-3050-A241F2A77666}"/>
           </ac:spMkLst>
         </pc:spChg>
         <pc:picChg chg="mod">
@@ -394,7 +402,7 @@
           </ac:picMkLst>
         </pc:picChg>
         <pc:picChg chg="add mod">
-          <ac:chgData name="YUE, Ka Leung" userId="541129f1-78f9-4b79-9dd5-c893242432f5" providerId="ADAL" clId="{854AE85A-E9C8-4BEA-88D8-4A6ACEAD765F}" dt="2024-11-18T21:10:07.314" v="1712" actId="14100"/>
+          <ac:chgData name="YUE, Ka Leung" userId="541129f1-78f9-4b79-9dd5-c893242432f5" providerId="ADAL" clId="{854AE85A-E9C8-4BEA-88D8-4A6ACEAD765F}" dt="2024-11-19T03:21:31.732" v="1951" actId="1037"/>
           <ac:picMkLst>
             <pc:docMk/>
             <pc:sldMk cId="3061954038" sldId="259"/>
@@ -8738,8 +8746,8 @@
           </a:extLst>
         </p:spPr>
       </p:pic>
-      <mc:AlternateContent xmlns:mc="http://schemas.openxmlformats.org/markup-compatibility/2006" xmlns:p14="http://schemas.microsoft.com/office/powerpoint/2010/main">
-        <mc:Choice Requires="p14">
+      <mc:AlternateContent xmlns:mc="http://schemas.openxmlformats.org/markup-compatibility/2006">
+        <mc:Choice xmlns:p14="http://schemas.microsoft.com/office/powerpoint/2010/main" Requires="p14">
           <p:contentPart p14:bwMode="auto" r:id="rId8">
             <p14:nvContentPartPr>
               <p14:cNvPr id="8" name="Ink 7">
@@ -8753,12 +8761,12 @@
               <p14:nvPr/>
             </p14:nvContentPartPr>
             <p14:xfrm>
-              <a:off x="10158356" y="3429000"/>
+              <a:off x="10214236" y="3515360"/>
               <a:ext cx="559080" cy="11880"/>
             </p14:xfrm>
           </p:contentPart>
         </mc:Choice>
-        <mc:Fallback xmlns="">
+        <mc:Fallback>
           <p:pic>
             <p:nvPicPr>
               <p:cNvPr id="8" name="Ink 7">
@@ -8779,7 +8787,7 @@
             </p:blipFill>
             <p:spPr>
               <a:xfrm>
-                <a:off x="10104356" y="3321000"/>
+                <a:off x="10160236" y="3407360"/>
                 <a:ext cx="666720" cy="227520"/>
               </a:xfrm>
               <a:prstGeom prst="rect">
@@ -8897,11 +8905,13 @@
         <p:spPr>
           <a:xfrm>
             <a:off x="913795" y="1732449"/>
-            <a:ext cx="7021891" cy="4058751"/>
+            <a:ext cx="7138005" cy="4058751"/>
           </a:xfrm>
         </p:spPr>
         <p:txBody>
-          <a:bodyPr/>
+          <a:bodyPr>
+            <a:normAutofit/>
+          </a:bodyPr>
           <a:lstStyle/>
           <a:p>
             <a:r>
@@ -8939,15 +8949,7 @@
             </a:r>
             <a:r>
               <a:rPr lang="en-US" altLang="zh-TW" dirty="0"/>
-              <a:t>model (Google’s </a:t>
-            </a:r>
-            <a:r>
-              <a:rPr lang="en-US" altLang="zh-TW" dirty="0" err="1"/>
-              <a:t>Gensim</a:t>
-            </a:r>
-            <a:r>
-              <a:rPr lang="en-US" altLang="zh-TW" dirty="0"/>
-              <a:t> library):</a:t>
+              <a:t>model (word2vec-google-news-300):</a:t>
             </a:r>
             <a:endParaRPr lang="en-US" altLang="zh-HK" dirty="0"/>
           </a:p>
@@ -8982,6 +8984,14 @@
                 </a:hlinkClick>
               </a:rPr>
               <a:t>the GitHub Repository</a:t>
+            </a:r>
+            <a:r>
+              <a:rPr lang="en-US" altLang="zh-HK" baseline="30000" dirty="0">
+                <a:solidFill>
+                  <a:srgbClr val="A9C3EB"/>
+                </a:solidFill>
+              </a:rPr>
+              <a:t>*</a:t>
             </a:r>
             <a:r>
               <a:rPr lang="en-US" altLang="zh-HK" dirty="0"/>
@@ -9075,7 +9085,7 @@
         </p:blipFill>
         <p:spPr>
           <a:xfrm>
-            <a:off x="7892909" y="4399151"/>
+            <a:off x="8014829" y="4399151"/>
             <a:ext cx="3209545" cy="2305677"/>
           </a:xfrm>
           <a:prstGeom prst="rect">
@@ -9113,6 +9123,54 @@
           </a:prstGeom>
         </p:spPr>
       </p:pic>
+      <p:sp>
+        <p:nvSpPr>
+          <p:cNvPr id="9" name="Footer Placeholder 8">
+            <a:extLst>
+              <a:ext uri="{FF2B5EF4-FFF2-40B4-BE49-F238E27FC236}">
+                <a16:creationId xmlns:a16="http://schemas.microsoft.com/office/drawing/2014/main" id="{ADA993E3-54AC-E729-3050-A241F2A77666}"/>
+              </a:ext>
+            </a:extLst>
+          </p:cNvPr>
+          <p:cNvSpPr>
+            <a:spLocks noGrp="1"/>
+          </p:cNvSpPr>
+          <p:nvPr>
+            <p:ph type="ftr" sz="quarter" idx="11"/>
+          </p:nvPr>
+        </p:nvSpPr>
+        <p:spPr/>
+        <p:txBody>
+          <a:bodyPr/>
+          <a:lstStyle/>
+          <a:p>
+            <a:r>
+              <a:rPr lang="en-HK" altLang="zh-HK" dirty="0"/>
+              <a:t>* Link: </a:t>
+            </a:r>
+            <a:r>
+              <a:rPr lang="en-HK" altLang="zh-HK" dirty="0">
+                <a:solidFill>
+                  <a:srgbClr val="A9C3EB"/>
+                </a:solidFill>
+                <a:hlinkClick r:id="rId2">
+                  <a:extLst>
+                    <a:ext uri="{A12FA001-AC4F-418D-AE19-62706E023703}">
+                      <ahyp:hlinkClr xmlns:ahyp="http://schemas.microsoft.com/office/drawing/2018/hyperlinkcolor" val="tx"/>
+                    </a:ext>
+                  </a:extLst>
+                </a:hlinkClick>
+              </a:rPr>
+              <a:t>https://github.com/yueagar/ESTR2018-project</a:t>
+            </a:r>
+            <a:endParaRPr lang="en-US" altLang="zh-HK" dirty="0">
+              <a:solidFill>
+                <a:srgbClr val="A9C3EB"/>
+              </a:solidFill>
+            </a:endParaRPr>
+          </a:p>
+        </p:txBody>
+      </p:sp>
     </p:spTree>
     <p:extLst>
       <p:ext uri="{BB962C8B-B14F-4D97-AF65-F5344CB8AC3E}">

</xml_diff>

<commit_message>
Updated presentation stuff again
</commit_message>
<xml_diff>
--- a/Presentation.pptx
+++ b/Presentation.pptx
@@ -122,7 +122,7 @@
 <p1510:revInfo xmlns:a="http://schemas.openxmlformats.org/drawingml/2006/main" xmlns:r="http://schemas.openxmlformats.org/officeDocument/2006/relationships" xmlns:p1510="http://schemas.microsoft.com/office/powerpoint/2015/10/main">
   <p1510:revLst>
     <p1510:client id="{854AE85A-E9C8-4BEA-88D8-4A6ACEAD765F}" v="152" dt="2024-11-19T03:25:44.503"/>
-    <p1510:client id="{F864161F-344C-40A2-8DAB-89930D8BF581}" v="300" dt="2024-11-19T09:33:43.987"/>
+    <p1510:client id="{F864161F-344C-40A2-8DAB-89930D8BF581}" v="305" dt="2024-11-19T10:14:49.700"/>
   </p1510:revLst>
 </p1510:revInfo>
 </file>
@@ -132,24 +132,40 @@
   <pc:docChgLst>
     <pc:chgData name="YUE, Ka Leung" userId="541129f1-78f9-4b79-9dd5-c893242432f5" providerId="ADAL" clId="{F864161F-344C-40A2-8DAB-89930D8BF581}"/>
     <pc:docChg chg="undo redo custSel modSld">
-      <pc:chgData name="YUE, Ka Leung" userId="541129f1-78f9-4b79-9dd5-c893242432f5" providerId="ADAL" clId="{F864161F-344C-40A2-8DAB-89930D8BF581}" dt="2024-11-19T09:33:43.987" v="915" actId="20577"/>
+      <pc:chgData name="YUE, Ka Leung" userId="541129f1-78f9-4b79-9dd5-c893242432f5" providerId="ADAL" clId="{F864161F-344C-40A2-8DAB-89930D8BF581}" dt="2024-11-19T10:41:08.940" v="1662" actId="20577"/>
       <pc:docMkLst>
         <pc:docMk/>
       </pc:docMkLst>
       <pc:sldChg chg="modSp mod">
-        <pc:chgData name="YUE, Ka Leung" userId="541129f1-78f9-4b79-9dd5-c893242432f5" providerId="ADAL" clId="{F864161F-344C-40A2-8DAB-89930D8BF581}" dt="2024-11-05T03:02:13.098" v="28" actId="20577"/>
+        <pc:chgData name="YUE, Ka Leung" userId="541129f1-78f9-4b79-9dd5-c893242432f5" providerId="ADAL" clId="{F864161F-344C-40A2-8DAB-89930D8BF581}" dt="2024-11-19T10:41:08.940" v="1662" actId="20577"/>
         <pc:sldMkLst>
           <pc:docMk/>
           <pc:sldMk cId="2374378964" sldId="257"/>
         </pc:sldMkLst>
         <pc:spChg chg="mod">
-          <ac:chgData name="YUE, Ka Leung" userId="541129f1-78f9-4b79-9dd5-c893242432f5" providerId="ADAL" clId="{F864161F-344C-40A2-8DAB-89930D8BF581}" dt="2024-11-05T03:02:13.098" v="28" actId="20577"/>
+          <ac:chgData name="YUE, Ka Leung" userId="541129f1-78f9-4b79-9dd5-c893242432f5" providerId="ADAL" clId="{F864161F-344C-40A2-8DAB-89930D8BF581}" dt="2024-11-19T10:26:49.116" v="1355" actId="20577"/>
           <ac:spMkLst>
             <pc:docMk/>
             <pc:sldMk cId="2374378964" sldId="257"/>
             <ac:spMk id="3" creationId="{58834CCC-396A-83AB-0CEC-E12C15CC31A6}"/>
           </ac:spMkLst>
         </pc:spChg>
+        <pc:spChg chg="mod">
+          <ac:chgData name="YUE, Ka Leung" userId="541129f1-78f9-4b79-9dd5-c893242432f5" providerId="ADAL" clId="{F864161F-344C-40A2-8DAB-89930D8BF581}" dt="2024-11-19T10:41:08.940" v="1662" actId="20577"/>
+          <ac:spMkLst>
+            <pc:docMk/>
+            <pc:sldMk cId="2374378964" sldId="257"/>
+            <ac:spMk id="4" creationId="{8579BE13-AD35-A8D1-5D55-36C91CBA6323}"/>
+          </ac:spMkLst>
+        </pc:spChg>
+        <pc:picChg chg="mod">
+          <ac:chgData name="YUE, Ka Leung" userId="541129f1-78f9-4b79-9dd5-c893242432f5" providerId="ADAL" clId="{F864161F-344C-40A2-8DAB-89930D8BF581}" dt="2024-11-19T10:04:27.856" v="1142" actId="1035"/>
+          <ac:picMkLst>
+            <pc:docMk/>
+            <pc:sldMk cId="2374378964" sldId="257"/>
+            <ac:picMk id="2050" creationId="{3353F6F6-2512-3873-893B-1EF077E1A709}"/>
+          </ac:picMkLst>
+        </pc:picChg>
       </pc:sldChg>
       <pc:sldChg chg="addSp delSp modSp mod">
         <pc:chgData name="YUE, Ka Leung" userId="541129f1-78f9-4b79-9dd5-c893242432f5" providerId="ADAL" clId="{F864161F-344C-40A2-8DAB-89930D8BF581}" dt="2024-11-19T09:33:43.987" v="915" actId="20577"/>
@@ -7299,7 +7315,15 @@
           <a:p>
             <a:r>
               <a:rPr lang="en-US" altLang="zh-HK" dirty="0"/>
-              <a:t>The word vectors depend on the words frequently appearing near the word in the data.</a:t>
+              <a:t>The word vectors capture the semantic meanings</a:t>
+            </a:r>
+            <a:r>
+              <a:rPr lang="en-US" altLang="zh-HK" baseline="30000" dirty="0"/>
+              <a:t>*</a:t>
+            </a:r>
+            <a:r>
+              <a:rPr lang="en-US" altLang="zh-HK" dirty="0"/>
+              <a:t> of words.</a:t>
             </a:r>
           </a:p>
           <a:p>
@@ -7367,6 +7391,40 @@
           </a:extLst>
         </p:spPr>
       </p:pic>
+      <p:sp>
+        <p:nvSpPr>
+          <p:cNvPr id="4" name="Footer Placeholder 3">
+            <a:extLst>
+              <a:ext uri="{FF2B5EF4-FFF2-40B4-BE49-F238E27FC236}">
+                <a16:creationId xmlns:a16="http://schemas.microsoft.com/office/drawing/2014/main" id="{8579BE13-AD35-A8D1-5D55-36C91CBA6323}"/>
+              </a:ext>
+            </a:extLst>
+          </p:cNvPr>
+          <p:cNvSpPr>
+            <a:spLocks noGrp="1"/>
+          </p:cNvSpPr>
+          <p:nvPr>
+            <p:ph type="ftr" sz="quarter" idx="11"/>
+          </p:nvPr>
+        </p:nvSpPr>
+        <p:spPr>
+          <a:xfrm>
+            <a:off x="913795" y="5883275"/>
+            <a:ext cx="7057013" cy="365125"/>
+          </a:xfrm>
+        </p:spPr>
+        <p:txBody>
+          <a:bodyPr/>
+          <a:lstStyle/>
+          <a:p>
+            <a:r>
+              <a:rPr lang="en-HK" altLang="zh-HK" dirty="0"/>
+              <a:t>* Semantic meaning: the interpretation or the inherent meaning of a word, phrase, sentence or text within a particular context.</a:t>
+            </a:r>
+            <a:endParaRPr lang="zh-HK" altLang="en-US" dirty="0"/>
+          </a:p>
+        </p:txBody>
+      </p:sp>
     </p:spTree>
     <p:extLst>
       <p:ext uri="{BB962C8B-B14F-4D97-AF65-F5344CB8AC3E}">
@@ -7426,8 +7484,8 @@
           </a:p>
         </p:txBody>
       </p:sp>
-      <mc:AlternateContent xmlns:mc="http://schemas.openxmlformats.org/markup-compatibility/2006">
-        <mc:Choice xmlns:a14="http://schemas.microsoft.com/office/drawing/2010/main" Requires="a14">
+      <mc:AlternateContent xmlns:mc="http://schemas.openxmlformats.org/markup-compatibility/2006" xmlns:a14="http://schemas.microsoft.com/office/drawing/2010/main">
+        <mc:Choice Requires="a14">
           <p:sp>
             <p:nvSpPr>
               <p:cNvPr id="3" name="內容版面配置區 2">
@@ -8639,7 +8697,7 @@
             </p:txBody>
           </p:sp>
         </mc:Choice>
-        <mc:Fallback>
+        <mc:Fallback xmlns="">
           <p:sp>
             <p:nvSpPr>
               <p:cNvPr id="3" name="內容版面配置區 2">

</xml_diff>